<commit_message>
Adicionado ISP e InjecaoDependencia
</commit_message>
<xml_diff>
--- a/doc/InjecaoDependencia.pptx
+++ b/doc/InjecaoDependencia.pptx
@@ -5,7 +5,7 @@
     <p:sldMasterId id="2147483648" r:id="rId1"/>
   </p:sldMasterIdLst>
   <p:notesMasterIdLst>
-    <p:notesMasterId r:id="rId21"/>
+    <p:notesMasterId r:id="rId27"/>
   </p:notesMasterIdLst>
   <p:sldIdLst>
     <p:sldId id="259" r:id="rId2"/>
@@ -26,7 +26,13 @@
     <p:sldId id="278" r:id="rId17"/>
     <p:sldId id="279" r:id="rId18"/>
     <p:sldId id="276" r:id="rId19"/>
-    <p:sldId id="277" r:id="rId20"/>
+    <p:sldId id="285" r:id="rId20"/>
+    <p:sldId id="284" r:id="rId21"/>
+    <p:sldId id="280" r:id="rId22"/>
+    <p:sldId id="283" r:id="rId23"/>
+    <p:sldId id="281" r:id="rId24"/>
+    <p:sldId id="286" r:id="rId25"/>
+    <p:sldId id="287" r:id="rId26"/>
   </p:sldIdLst>
   <p:sldSz cx="12192000" cy="6858000"/>
   <p:notesSz cx="6858000" cy="9144000"/>
@@ -330,7 +336,7 @@
   </p:defaultTextStyle>
   <p:extLst>
     <p:ext uri="{EFAFB233-063F-42B5-8137-9DF3F51BA10A}">
-      <p15:sldGuideLst xmlns:p15="http://schemas.microsoft.com/office/powerpoint/2012/main">
+      <p15:sldGuideLst xmlns:p15="http://schemas.microsoft.com/office/powerpoint/2012/main" xmlns="">
         <p15:guide id="1" orient="horz" pos="2160">
           <p15:clr>
             <a:srgbClr val="A4A3A4"/>
@@ -1304,7 +1310,7 @@
     </p:spTree>
     <p:extLst>
       <p:ext uri="{BB962C8B-B14F-4D97-AF65-F5344CB8AC3E}">
-        <p14:creationId xmlns:p14="http://schemas.microsoft.com/office/powerpoint/2010/main" val="3822307344"/>
+        <p14:creationId xmlns:p14="http://schemas.microsoft.com/office/powerpoint/2010/main" val="3189123950"/>
       </p:ext>
     </p:extLst>
   </p:cSld>
@@ -1371,6 +1377,426 @@
     <p:extLst>
       <p:ext uri="{BB962C8B-B14F-4D97-AF65-F5344CB8AC3E}">
         <p14:creationId xmlns:p14="http://schemas.microsoft.com/office/powerpoint/2010/main" val="769200628"/>
+      </p:ext>
+    </p:extLst>
+  </p:cSld>
+  <p:clrMapOvr>
+    <a:masterClrMapping/>
+  </p:clrMapOvr>
+</p:notes>
+</file>
+
+<file path=ppt/notesSlides/notesSlide20.xml><?xml version="1.0" encoding="utf-8"?>
+<p:notes xmlns:a="http://schemas.openxmlformats.org/drawingml/2006/main" xmlns:r="http://schemas.openxmlformats.org/officeDocument/2006/relationships" xmlns:p="http://schemas.openxmlformats.org/presentationml/2006/main">
+  <p:cSld>
+    <p:spTree>
+      <p:nvGrpSpPr>
+        <p:cNvPr id="1" name=""/>
+        <p:cNvGrpSpPr/>
+        <p:nvPr/>
+      </p:nvGrpSpPr>
+      <p:grpSpPr>
+        <a:xfrm>
+          <a:off x="0" y="0"/>
+          <a:ext cx="0" cy="0"/>
+          <a:chOff x="0" y="0"/>
+          <a:chExt cx="0" cy="0"/>
+        </a:xfrm>
+      </p:grpSpPr>
+      <p:sp>
+        <p:nvSpPr>
+          <p:cNvPr id="2" name="Espaço Reservado para Imagem de Slide 1"/>
+          <p:cNvSpPr>
+            <a:spLocks noGrp="1" noRot="1" noChangeAspect="1"/>
+          </p:cNvSpPr>
+          <p:nvPr>
+            <p:ph type="sldImg"/>
+          </p:nvPr>
+        </p:nvSpPr>
+        <p:spPr>
+          <a:xfrm>
+            <a:off x="381000" y="685800"/>
+            <a:ext cx="6096000" cy="3429000"/>
+          </a:xfrm>
+        </p:spPr>
+      </p:sp>
+      <p:sp>
+        <p:nvSpPr>
+          <p:cNvPr id="3" name="Espaço Reservado para Anotações 2"/>
+          <p:cNvSpPr>
+            <a:spLocks noGrp="1"/>
+          </p:cNvSpPr>
+          <p:nvPr>
+            <p:ph type="body" idx="1"/>
+          </p:nvPr>
+        </p:nvSpPr>
+        <p:spPr/>
+        <p:txBody>
+          <a:bodyPr/>
+          <a:lstStyle/>
+          <a:p>
+            <a:r>
+              <a:rPr lang="pt-BR" dirty="0" smtClean="0"/>
+              <a:t>https://www.treinaweb.com.br/blog/entendendo-injecao-de-dependencia/</a:t>
+            </a:r>
+            <a:endParaRPr lang="pt-BR" dirty="0"/>
+          </a:p>
+        </p:txBody>
+      </p:sp>
+    </p:spTree>
+    <p:extLst>
+      <p:ext uri="{BB962C8B-B14F-4D97-AF65-F5344CB8AC3E}">
+        <p14:creationId xmlns:p14="http://schemas.microsoft.com/office/powerpoint/2010/main" val="3189123950"/>
+      </p:ext>
+    </p:extLst>
+  </p:cSld>
+  <p:clrMapOvr>
+    <a:masterClrMapping/>
+  </p:clrMapOvr>
+</p:notes>
+</file>
+
+<file path=ppt/notesSlides/notesSlide21.xml><?xml version="1.0" encoding="utf-8"?>
+<p:notes xmlns:a="http://schemas.openxmlformats.org/drawingml/2006/main" xmlns:r="http://schemas.openxmlformats.org/officeDocument/2006/relationships" xmlns:p="http://schemas.openxmlformats.org/presentationml/2006/main">
+  <p:cSld>
+    <p:spTree>
+      <p:nvGrpSpPr>
+        <p:cNvPr id="1" name=""/>
+        <p:cNvGrpSpPr/>
+        <p:nvPr/>
+      </p:nvGrpSpPr>
+      <p:grpSpPr>
+        <a:xfrm>
+          <a:off x="0" y="0"/>
+          <a:ext cx="0" cy="0"/>
+          <a:chOff x="0" y="0"/>
+          <a:chExt cx="0" cy="0"/>
+        </a:xfrm>
+      </p:grpSpPr>
+      <p:sp>
+        <p:nvSpPr>
+          <p:cNvPr id="2" name="Espaço Reservado para Imagem de Slide 1"/>
+          <p:cNvSpPr>
+            <a:spLocks noGrp="1" noRot="1" noChangeAspect="1"/>
+          </p:cNvSpPr>
+          <p:nvPr>
+            <p:ph type="sldImg"/>
+          </p:nvPr>
+        </p:nvSpPr>
+        <p:spPr>
+          <a:xfrm>
+            <a:off x="381000" y="685800"/>
+            <a:ext cx="6096000" cy="3429000"/>
+          </a:xfrm>
+        </p:spPr>
+      </p:sp>
+      <p:sp>
+        <p:nvSpPr>
+          <p:cNvPr id="3" name="Espaço Reservado para Anotações 2"/>
+          <p:cNvSpPr>
+            <a:spLocks noGrp="1"/>
+          </p:cNvSpPr>
+          <p:nvPr>
+            <p:ph type="body" idx="1"/>
+          </p:nvPr>
+        </p:nvSpPr>
+        <p:spPr/>
+        <p:txBody>
+          <a:bodyPr/>
+          <a:lstStyle/>
+          <a:p>
+            <a:r>
+              <a:rPr lang="pt-BR" dirty="0" smtClean="0"/>
+              <a:t>https://www.treinaweb.com.br/blog/entendendo-injecao-de-dependencia/</a:t>
+            </a:r>
+            <a:endParaRPr lang="pt-BR" dirty="0"/>
+          </a:p>
+        </p:txBody>
+      </p:sp>
+    </p:spTree>
+    <p:extLst>
+      <p:ext uri="{BB962C8B-B14F-4D97-AF65-F5344CB8AC3E}">
+        <p14:creationId xmlns:p14="http://schemas.microsoft.com/office/powerpoint/2010/main" val="3189123950"/>
+      </p:ext>
+    </p:extLst>
+  </p:cSld>
+  <p:clrMapOvr>
+    <a:masterClrMapping/>
+  </p:clrMapOvr>
+</p:notes>
+</file>
+
+<file path=ppt/notesSlides/notesSlide22.xml><?xml version="1.0" encoding="utf-8"?>
+<p:notes xmlns:a="http://schemas.openxmlformats.org/drawingml/2006/main" xmlns:r="http://schemas.openxmlformats.org/officeDocument/2006/relationships" xmlns:p="http://schemas.openxmlformats.org/presentationml/2006/main">
+  <p:cSld>
+    <p:spTree>
+      <p:nvGrpSpPr>
+        <p:cNvPr id="1" name=""/>
+        <p:cNvGrpSpPr/>
+        <p:nvPr/>
+      </p:nvGrpSpPr>
+      <p:grpSpPr>
+        <a:xfrm>
+          <a:off x="0" y="0"/>
+          <a:ext cx="0" cy="0"/>
+          <a:chOff x="0" y="0"/>
+          <a:chExt cx="0" cy="0"/>
+        </a:xfrm>
+      </p:grpSpPr>
+      <p:sp>
+        <p:nvSpPr>
+          <p:cNvPr id="2" name="Espaço Reservado para Imagem de Slide 1"/>
+          <p:cNvSpPr>
+            <a:spLocks noGrp="1" noRot="1" noChangeAspect="1"/>
+          </p:cNvSpPr>
+          <p:nvPr>
+            <p:ph type="sldImg"/>
+          </p:nvPr>
+        </p:nvSpPr>
+        <p:spPr>
+          <a:xfrm>
+            <a:off x="381000" y="685800"/>
+            <a:ext cx="6096000" cy="3429000"/>
+          </a:xfrm>
+        </p:spPr>
+      </p:sp>
+      <p:sp>
+        <p:nvSpPr>
+          <p:cNvPr id="3" name="Espaço Reservado para Anotações 2"/>
+          <p:cNvSpPr>
+            <a:spLocks noGrp="1"/>
+          </p:cNvSpPr>
+          <p:nvPr>
+            <p:ph type="body" idx="1"/>
+          </p:nvPr>
+        </p:nvSpPr>
+        <p:spPr/>
+        <p:txBody>
+          <a:bodyPr/>
+          <a:lstStyle/>
+          <a:p>
+            <a:r>
+              <a:rPr lang="pt-BR" dirty="0" smtClean="0"/>
+              <a:t>https://www.treinaweb.com.br/blog/entendendo-injecao-de-dependencia/</a:t>
+            </a:r>
+            <a:endParaRPr lang="pt-BR" dirty="0"/>
+          </a:p>
+        </p:txBody>
+      </p:sp>
+    </p:spTree>
+    <p:extLst>
+      <p:ext uri="{BB962C8B-B14F-4D97-AF65-F5344CB8AC3E}">
+        <p14:creationId xmlns:p14="http://schemas.microsoft.com/office/powerpoint/2010/main" val="3189123950"/>
+      </p:ext>
+    </p:extLst>
+  </p:cSld>
+  <p:clrMapOvr>
+    <a:masterClrMapping/>
+  </p:clrMapOvr>
+</p:notes>
+</file>
+
+<file path=ppt/notesSlides/notesSlide23.xml><?xml version="1.0" encoding="utf-8"?>
+<p:notes xmlns:a="http://schemas.openxmlformats.org/drawingml/2006/main" xmlns:r="http://schemas.openxmlformats.org/officeDocument/2006/relationships" xmlns:p="http://schemas.openxmlformats.org/presentationml/2006/main">
+  <p:cSld>
+    <p:spTree>
+      <p:nvGrpSpPr>
+        <p:cNvPr id="1" name=""/>
+        <p:cNvGrpSpPr/>
+        <p:nvPr/>
+      </p:nvGrpSpPr>
+      <p:grpSpPr>
+        <a:xfrm>
+          <a:off x="0" y="0"/>
+          <a:ext cx="0" cy="0"/>
+          <a:chOff x="0" y="0"/>
+          <a:chExt cx="0" cy="0"/>
+        </a:xfrm>
+      </p:grpSpPr>
+      <p:sp>
+        <p:nvSpPr>
+          <p:cNvPr id="2" name="Espaço Reservado para Imagem de Slide 1"/>
+          <p:cNvSpPr>
+            <a:spLocks noGrp="1" noRot="1" noChangeAspect="1"/>
+          </p:cNvSpPr>
+          <p:nvPr>
+            <p:ph type="sldImg"/>
+          </p:nvPr>
+        </p:nvSpPr>
+        <p:spPr>
+          <a:xfrm>
+            <a:off x="381000" y="685800"/>
+            <a:ext cx="6096000" cy="3429000"/>
+          </a:xfrm>
+        </p:spPr>
+      </p:sp>
+      <p:sp>
+        <p:nvSpPr>
+          <p:cNvPr id="3" name="Espaço Reservado para Anotações 2"/>
+          <p:cNvSpPr>
+            <a:spLocks noGrp="1"/>
+          </p:cNvSpPr>
+          <p:nvPr>
+            <p:ph type="body" idx="1"/>
+          </p:nvPr>
+        </p:nvSpPr>
+        <p:spPr/>
+        <p:txBody>
+          <a:bodyPr/>
+          <a:lstStyle/>
+          <a:p>
+            <a:r>
+              <a:rPr lang="pt-BR" dirty="0" smtClean="0"/>
+              <a:t>https://www.treinaweb.com.br/blog/entendendo-injecao-de-dependencia/</a:t>
+            </a:r>
+            <a:endParaRPr lang="pt-BR" dirty="0"/>
+          </a:p>
+        </p:txBody>
+      </p:sp>
+    </p:spTree>
+    <p:extLst>
+      <p:ext uri="{BB962C8B-B14F-4D97-AF65-F5344CB8AC3E}">
+        <p14:creationId xmlns:p14="http://schemas.microsoft.com/office/powerpoint/2010/main" val="3189123950"/>
+      </p:ext>
+    </p:extLst>
+  </p:cSld>
+  <p:clrMapOvr>
+    <a:masterClrMapping/>
+  </p:clrMapOvr>
+</p:notes>
+</file>
+
+<file path=ppt/notesSlides/notesSlide24.xml><?xml version="1.0" encoding="utf-8"?>
+<p:notes xmlns:a="http://schemas.openxmlformats.org/drawingml/2006/main" xmlns:r="http://schemas.openxmlformats.org/officeDocument/2006/relationships" xmlns:p="http://schemas.openxmlformats.org/presentationml/2006/main">
+  <p:cSld>
+    <p:spTree>
+      <p:nvGrpSpPr>
+        <p:cNvPr id="1" name=""/>
+        <p:cNvGrpSpPr/>
+        <p:nvPr/>
+      </p:nvGrpSpPr>
+      <p:grpSpPr>
+        <a:xfrm>
+          <a:off x="0" y="0"/>
+          <a:ext cx="0" cy="0"/>
+          <a:chOff x="0" y="0"/>
+          <a:chExt cx="0" cy="0"/>
+        </a:xfrm>
+      </p:grpSpPr>
+      <p:sp>
+        <p:nvSpPr>
+          <p:cNvPr id="2" name="Espaço Reservado para Imagem de Slide 1"/>
+          <p:cNvSpPr>
+            <a:spLocks noGrp="1" noRot="1" noChangeAspect="1"/>
+          </p:cNvSpPr>
+          <p:nvPr>
+            <p:ph type="sldImg"/>
+          </p:nvPr>
+        </p:nvSpPr>
+        <p:spPr>
+          <a:xfrm>
+            <a:off x="381000" y="685800"/>
+            <a:ext cx="6096000" cy="3429000"/>
+          </a:xfrm>
+        </p:spPr>
+      </p:sp>
+      <p:sp>
+        <p:nvSpPr>
+          <p:cNvPr id="3" name="Espaço Reservado para Anotações 2"/>
+          <p:cNvSpPr>
+            <a:spLocks noGrp="1"/>
+          </p:cNvSpPr>
+          <p:nvPr>
+            <p:ph type="body" idx="1"/>
+          </p:nvPr>
+        </p:nvSpPr>
+        <p:spPr/>
+        <p:txBody>
+          <a:bodyPr/>
+          <a:lstStyle/>
+          <a:p>
+            <a:r>
+              <a:rPr lang="pt-BR" dirty="0" smtClean="0"/>
+              <a:t>https://medium.com/@fulviocanducci/injeção-de-dependências-asp-net-core-baa3bc1ea9c9</a:t>
+            </a:r>
+            <a:endParaRPr lang="pt-BR" dirty="0"/>
+          </a:p>
+        </p:txBody>
+      </p:sp>
+    </p:spTree>
+    <p:extLst>
+      <p:ext uri="{BB962C8B-B14F-4D97-AF65-F5344CB8AC3E}">
+        <p14:creationId xmlns:p14="http://schemas.microsoft.com/office/powerpoint/2010/main" val="3189123950"/>
+      </p:ext>
+    </p:extLst>
+  </p:cSld>
+  <p:clrMapOvr>
+    <a:masterClrMapping/>
+  </p:clrMapOvr>
+</p:notes>
+</file>
+
+<file path=ppt/notesSlides/notesSlide25.xml><?xml version="1.0" encoding="utf-8"?>
+<p:notes xmlns:a="http://schemas.openxmlformats.org/drawingml/2006/main" xmlns:r="http://schemas.openxmlformats.org/officeDocument/2006/relationships" xmlns:p="http://schemas.openxmlformats.org/presentationml/2006/main">
+  <p:cSld>
+    <p:spTree>
+      <p:nvGrpSpPr>
+        <p:cNvPr id="1" name=""/>
+        <p:cNvGrpSpPr/>
+        <p:nvPr/>
+      </p:nvGrpSpPr>
+      <p:grpSpPr>
+        <a:xfrm>
+          <a:off x="0" y="0"/>
+          <a:ext cx="0" cy="0"/>
+          <a:chOff x="0" y="0"/>
+          <a:chExt cx="0" cy="0"/>
+        </a:xfrm>
+      </p:grpSpPr>
+      <p:sp>
+        <p:nvSpPr>
+          <p:cNvPr id="2" name="Espaço Reservado para Imagem de Slide 1"/>
+          <p:cNvSpPr>
+            <a:spLocks noGrp="1" noRot="1" noChangeAspect="1"/>
+          </p:cNvSpPr>
+          <p:nvPr>
+            <p:ph type="sldImg"/>
+          </p:nvPr>
+        </p:nvSpPr>
+        <p:spPr>
+          <a:xfrm>
+            <a:off x="381000" y="685800"/>
+            <a:ext cx="6096000" cy="3429000"/>
+          </a:xfrm>
+        </p:spPr>
+      </p:sp>
+      <p:sp>
+        <p:nvSpPr>
+          <p:cNvPr id="3" name="Espaço Reservado para Anotações 2"/>
+          <p:cNvSpPr>
+            <a:spLocks noGrp="1"/>
+          </p:cNvSpPr>
+          <p:nvPr>
+            <p:ph type="body" idx="1"/>
+          </p:nvPr>
+        </p:nvSpPr>
+        <p:spPr/>
+        <p:txBody>
+          <a:bodyPr/>
+          <a:lstStyle/>
+          <a:p>
+            <a:r>
+              <a:rPr lang="pt-BR" smtClean="0"/>
+              <a:t>https://medium.com/@fulviocanducci/injeção-de-dependências-asp-net-core-baa3bc1ea9c9</a:t>
+            </a:r>
+            <a:endParaRPr lang="pt-BR" dirty="0"/>
+          </a:p>
+        </p:txBody>
+      </p:sp>
+    </p:spTree>
+    <p:extLst>
+      <p:ext uri="{BB962C8B-B14F-4D97-AF65-F5344CB8AC3E}">
+        <p14:creationId xmlns:p14="http://schemas.microsoft.com/office/powerpoint/2010/main" val="3189123950"/>
       </p:ext>
     </p:extLst>
   </p:cSld>
@@ -1633,11 +2059,7 @@
           <a:p>
             <a:r>
               <a:rPr lang="pt-BR" dirty="0" smtClean="0"/>
-              <a:t>https://www.eduardopires.net.br/2013/05/open-closed-principle-ocp</a:t>
-            </a:r>
-            <a:r>
-              <a:rPr lang="pt-BR" dirty="0" smtClean="0"/>
-              <a:t>/</a:t>
+              <a:t>https://www.eduardopires.net.br/2013/05/open-closed-principle-ocp/</a:t>
             </a:r>
           </a:p>
           <a:p>
@@ -2463,7 +2885,7 @@
           </a:ln>
           <a:extLst>
             <a:ext uri="{C572A759-6A51-4108-AA02-DFA0A04FC94B}">
-              <ma14:wrappingTextBoxFlag xmlns="" xmlns:ma14="http://schemas.microsoft.com/office/mac/drawingml/2011/main" val="1"/>
+              <ma14:wrappingTextBoxFlag xmlns:ma14="http://schemas.microsoft.com/office/mac/drawingml/2011/main" xmlns="" val="1"/>
             </a:ext>
           </a:extLst>
         </p:spPr>
@@ -2502,7 +2924,7 @@
           </a:ln>
           <a:extLst>
             <a:ext uri="{C572A759-6A51-4108-AA02-DFA0A04FC94B}">
-              <ma14:wrappingTextBoxFlag xmlns="" xmlns:ma14="http://schemas.microsoft.com/office/mac/drawingml/2011/main" val="1"/>
+              <ma14:wrappingTextBoxFlag xmlns:ma14="http://schemas.microsoft.com/office/mac/drawingml/2011/main" xmlns="" val="1"/>
             </a:ext>
           </a:extLst>
         </p:spPr>
@@ -3635,7 +4057,7 @@
           </a:ln>
           <a:extLst>
             <a:ext uri="{C572A759-6A51-4108-AA02-DFA0A04FC94B}">
-              <ma14:wrappingTextBoxFlag xmlns="" xmlns:ma14="http://schemas.microsoft.com/office/mac/drawingml/2011/main" val="1"/>
+              <ma14:wrappingTextBoxFlag xmlns:ma14="http://schemas.microsoft.com/office/mac/drawingml/2011/main" xmlns="" val="1"/>
             </a:ext>
           </a:extLst>
         </p:spPr>
@@ -4222,7 +4644,7 @@
           </a:ln>
           <a:extLst>
             <a:ext uri="{C572A759-6A51-4108-AA02-DFA0A04FC94B}">
-              <ma14:wrappingTextBoxFlag xmlns="" xmlns:ma14="http://schemas.microsoft.com/office/mac/drawingml/2011/main" val="1"/>
+              <ma14:wrappingTextBoxFlag xmlns:ma14="http://schemas.microsoft.com/office/mac/drawingml/2011/main" xmlns="" val="1"/>
             </a:ext>
           </a:extLst>
         </p:spPr>
@@ -4609,7 +5031,7 @@
           </a:ln>
           <a:extLst>
             <a:ext uri="{C572A759-6A51-4108-AA02-DFA0A04FC94B}">
-              <ma14:wrappingTextBoxFlag xmlns="" xmlns:ma14="http://schemas.microsoft.com/office/mac/drawingml/2011/main" val="1"/>
+              <ma14:wrappingTextBoxFlag xmlns:ma14="http://schemas.microsoft.com/office/mac/drawingml/2011/main" xmlns="" val="1"/>
             </a:ext>
           </a:extLst>
         </p:spPr>
@@ -5020,7 +5442,7 @@
           </a:ln>
           <a:extLst>
             <a:ext uri="{C572A759-6A51-4108-AA02-DFA0A04FC94B}">
-              <ma14:wrappingTextBoxFlag xmlns="" xmlns:ma14="http://schemas.microsoft.com/office/mac/drawingml/2011/main" val="1"/>
+              <ma14:wrappingTextBoxFlag xmlns:ma14="http://schemas.microsoft.com/office/mac/drawingml/2011/main" xmlns="" val="1"/>
             </a:ext>
           </a:extLst>
         </p:spPr>
@@ -5621,7 +6043,7 @@
           </a:ln>
           <a:extLst>
             <a:ext uri="{C572A759-6A51-4108-AA02-DFA0A04FC94B}">
-              <ma14:wrappingTextBoxFlag xmlns="" xmlns:ma14="http://schemas.microsoft.com/office/mac/drawingml/2011/main" val="1"/>
+              <ma14:wrappingTextBoxFlag xmlns:ma14="http://schemas.microsoft.com/office/mac/drawingml/2011/main" xmlns="" val="1"/>
             </a:ext>
           </a:extLst>
         </p:spPr>
@@ -6452,7 +6874,7 @@
           </a:ln>
           <a:extLst>
             <a:ext uri="{C572A759-6A51-4108-AA02-DFA0A04FC94B}">
-              <ma14:wrappingTextBoxFlag xmlns="" xmlns:ma14="http://schemas.microsoft.com/office/mac/drawingml/2011/main" val="1"/>
+              <ma14:wrappingTextBoxFlag xmlns:ma14="http://schemas.microsoft.com/office/mac/drawingml/2011/main" xmlns="" val="1"/>
             </a:ext>
           </a:extLst>
         </p:spPr>
@@ -6881,7 +7303,7 @@
           </a:ln>
           <a:extLst>
             <a:ext uri="{C572A759-6A51-4108-AA02-DFA0A04FC94B}">
-              <ma14:wrappingTextBoxFlag xmlns="" xmlns:ma14="http://schemas.microsoft.com/office/mac/drawingml/2011/main" val="1"/>
+              <ma14:wrappingTextBoxFlag xmlns:ma14="http://schemas.microsoft.com/office/mac/drawingml/2011/main" xmlns="" val="1"/>
             </a:ext>
           </a:extLst>
         </p:spPr>
@@ -7184,7 +7606,7 @@
         </p:nvSpPr>
         <p:spPr>
           <a:xfrm>
-            <a:off x="2785730" y="4683983"/>
+            <a:off x="3577468" y="4685325"/>
             <a:ext cx="2264734" cy="923328"/>
           </a:xfrm>
           <a:prstGeom prst="rect">
@@ -7332,7 +7754,7 @@
         </p:nvSpPr>
         <p:spPr>
           <a:xfrm>
-            <a:off x="6819013" y="4652637"/>
+            <a:off x="6819013" y="4293325"/>
             <a:ext cx="2239926" cy="392000"/>
           </a:xfrm>
           <a:prstGeom prst="rect">
@@ -7416,7 +7838,7 @@
         </p:nvSpPr>
         <p:spPr>
           <a:xfrm>
-            <a:off x="3276415" y="4960981"/>
+            <a:off x="4068152" y="4948518"/>
             <a:ext cx="1283363" cy="369330"/>
           </a:xfrm>
           <a:prstGeom prst="rect">
@@ -7477,7 +7899,7 @@
         </p:nvSpPr>
         <p:spPr>
           <a:xfrm>
-            <a:off x="7434351" y="4652637"/>
+            <a:off x="7434351" y="4304660"/>
             <a:ext cx="1009249" cy="369330"/>
           </a:xfrm>
           <a:prstGeom prst="rect">
@@ -7643,17 +8065,17 @@
         <p:nvCxnSpPr>
           <p:cNvPr id="30" name="Conector angulado 29"/>
           <p:cNvCxnSpPr>
-            <a:stCxn id="4" idx="3"/>
+            <a:stCxn id="4" idx="0"/>
             <a:endCxn id="11" idx="1"/>
           </p:cNvCxnSpPr>
           <p:nvPr/>
         </p:nvCxnSpPr>
         <p:spPr>
-          <a:xfrm flipV="1">
-            <a:off x="5050464" y="4848637"/>
-            <a:ext cx="1768549" cy="297010"/>
+          <a:xfrm rot="5400000" flipH="1" flipV="1">
+            <a:off x="5666424" y="3532736"/>
+            <a:ext cx="196000" cy="2109178"/>
           </a:xfrm>
-          <a:prstGeom prst="bentConnector3">
+          <a:prstGeom prst="bentConnector2">
             <a:avLst/>
           </a:prstGeom>
           <a:noFill/>
@@ -7698,8 +8120,8 @@
         </p:nvCxnSpPr>
         <p:spPr>
           <a:xfrm rot="16200000" flipH="1">
-            <a:off x="5257165" y="4268242"/>
-            <a:ext cx="222779" cy="2900915"/>
+            <a:off x="5653705" y="4664782"/>
+            <a:ext cx="221437" cy="2109177"/>
           </a:xfrm>
           <a:prstGeom prst="bentConnector2">
             <a:avLst/>
@@ -8000,7 +8422,7 @@
           </a:ln>
           <a:extLst>
             <a:ext uri="{C572A759-6A51-4108-AA02-DFA0A04FC94B}">
-              <ma14:wrappingTextBoxFlag xmlns="" xmlns:ma14="http://schemas.microsoft.com/office/mac/drawingml/2011/main" val="1"/>
+              <ma14:wrappingTextBoxFlag xmlns:ma14="http://schemas.microsoft.com/office/mac/drawingml/2011/main" xmlns="" val="1"/>
             </a:ext>
           </a:extLst>
         </p:spPr>
@@ -8506,7 +8928,7 @@
           </a:ln>
           <a:extLst>
             <a:ext uri="{C572A759-6A51-4108-AA02-DFA0A04FC94B}">
-              <ma14:wrappingTextBoxFlag xmlns="" xmlns:ma14="http://schemas.microsoft.com/office/mac/drawingml/2011/main" val="1"/>
+              <ma14:wrappingTextBoxFlag xmlns:ma14="http://schemas.microsoft.com/office/mac/drawingml/2011/main" xmlns="" val="1"/>
             </a:ext>
           </a:extLst>
         </p:spPr>
@@ -8876,6 +9298,115 @@
       </p:grpSpPr>
       <p:sp>
         <p:nvSpPr>
+          <p:cNvPr id="2" name="CaixaDeTexto 1"/>
+          <p:cNvSpPr txBox="1"/>
+          <p:nvPr/>
+        </p:nvSpPr>
+        <p:spPr>
+          <a:xfrm>
+            <a:off x="1752318" y="2345181"/>
+            <a:ext cx="5373311" cy="2169823"/>
+          </a:xfrm>
+          <a:prstGeom prst="rect">
+            <a:avLst/>
+          </a:prstGeom>
+          <a:noFill/>
+          <a:ln w="12700" cap="flat">
+            <a:noFill/>
+            <a:miter lim="400000"/>
+          </a:ln>
+          <a:effectLst/>
+          <a:sp3d/>
+        </p:spPr>
+        <p:style>
+          <a:lnRef idx="0">
+            <a:scrgbClr r="0" g="0" b="0"/>
+          </a:lnRef>
+          <a:fillRef idx="0">
+            <a:scrgbClr r="0" g="0" b="0"/>
+          </a:fillRef>
+          <a:effectRef idx="0">
+            <a:scrgbClr r="0" g="0" b="0"/>
+          </a:effectRef>
+          <a:fontRef idx="none"/>
+        </p:style>
+        <p:txBody>
+          <a:bodyPr rot="0" spcFirstLastPara="1" vertOverflow="overflow" horzOverflow="overflow" vert="horz" wrap="square" lIns="45719" tIns="45719" rIns="45719" bIns="45719" numCol="1" spcCol="38100" rtlCol="0" anchor="t">
+            <a:spAutoFit/>
+          </a:bodyPr>
+          <a:lstStyle/>
+          <a:p>
+            <a:pPr lvl="8" indent="0" algn="just">
+              <a:lnSpc>
+                <a:spcPct val="150000"/>
+              </a:lnSpc>
+            </a:pPr>
+            <a:r>
+              <a:rPr lang="pt-BR" dirty="0">
+                <a:solidFill>
+                  <a:srgbClr val="666666"/>
+                </a:solidFill>
+              </a:rPr>
+              <a:t>O padrão </a:t>
+            </a:r>
+            <a:r>
+              <a:rPr lang="pt-BR" dirty="0" err="1">
+                <a:solidFill>
+                  <a:srgbClr val="666666"/>
+                </a:solidFill>
+              </a:rPr>
+              <a:t>IoC</a:t>
+            </a:r>
+            <a:r>
+              <a:rPr lang="pt-BR" dirty="0">
+                <a:solidFill>
+                  <a:srgbClr val="666666"/>
+                </a:solidFill>
+              </a:rPr>
+              <a:t> nos diz o </a:t>
+            </a:r>
+            <a:r>
+              <a:rPr lang="pt-BR" dirty="0" smtClean="0">
+                <a:solidFill>
+                  <a:srgbClr val="666666"/>
+                </a:solidFill>
+              </a:rPr>
+              <a:t>que "</a:t>
+            </a:r>
+            <a:r>
+              <a:rPr lang="pt-BR" dirty="0">
+                <a:solidFill>
+                  <a:srgbClr val="666666"/>
+                </a:solidFill>
+              </a:rPr>
+              <a:t>Devemos delegar a tarefa de criação de um objeto </a:t>
+            </a:r>
+            <a:r>
+              <a:rPr lang="pt-BR" dirty="0" smtClean="0">
+                <a:solidFill>
+                  <a:srgbClr val="666666"/>
+                </a:solidFill>
+              </a:rPr>
+              <a:t>a </a:t>
+            </a:r>
+            <a:r>
+              <a:rPr lang="pt-BR" dirty="0">
+                <a:solidFill>
+                  <a:srgbClr val="666666"/>
+                </a:solidFill>
+              </a:rPr>
+              <a:t>uma outra entidade como uma outra classe, interface, componente, etc. de forma a termos um baixo acoplamento e minimizar a dependências entre os objetos."</a:t>
+            </a:r>
+            <a:endParaRPr lang="pt-BR" b="1" u="sng" dirty="0" smtClean="0">
+              <a:solidFill>
+                <a:srgbClr val="666666"/>
+              </a:solidFill>
+            </a:endParaRPr>
+          </a:p>
+        </p:txBody>
+      </p:sp>
+      <p:sp>
+        <p:nvSpPr>
           <p:cNvPr id="6" name="Shape 120"/>
           <p:cNvSpPr txBox="1">
             <a:spLocks/>
@@ -8895,7 +9426,7 @@
           </a:ln>
           <a:extLst>
             <a:ext uri="{C572A759-6A51-4108-AA02-DFA0A04FC94B}">
-              <ma14:wrappingTextBoxFlag xmlns="" xmlns:ma14="http://schemas.microsoft.com/office/mac/drawingml/2011/main" val="1"/>
+              <ma14:wrappingTextBoxFlag xmlns:ma14="http://schemas.microsoft.com/office/mac/drawingml/2011/main" xmlns="" val="1"/>
             </a:ext>
           </a:extLst>
         </p:spPr>
@@ -9174,6 +9705,30 @@
                 </a:solidFill>
               </a:defRPr>
             </a:pPr>
+            <a:r>
+              <a:rPr lang="pt-BR" sz="5400" b="1" dirty="0" smtClean="0">
+                <a:solidFill>
+                  <a:srgbClr val="11A79D"/>
+                </a:solidFill>
+              </a:rPr>
+              <a:t>Baixo acoplamento (</a:t>
+            </a:r>
+            <a:r>
+              <a:rPr lang="pt-BR" sz="5400" b="1" dirty="0" err="1" smtClean="0">
+                <a:solidFill>
+                  <a:srgbClr val="11A79D"/>
+                </a:solidFill>
+              </a:rPr>
+              <a:t>IoC</a:t>
+            </a:r>
+            <a:r>
+              <a:rPr lang="pt-BR" sz="5400" b="1" dirty="0" smtClean="0">
+                <a:solidFill>
+                  <a:srgbClr val="11A79D"/>
+                </a:solidFill>
+              </a:rPr>
+              <a:t>)</a:t>
+            </a:r>
             <a:endParaRPr lang="pt-BR" sz="5400" b="1" dirty="0">
               <a:solidFill>
                 <a:schemeClr val="tx2"/>
@@ -9184,7 +9739,7 @@
       </p:sp>
       <p:pic>
         <p:nvPicPr>
-          <p:cNvPr id="5" name="Imagem 4"/>
+          <p:cNvPr id="7" name="Imagem 6"/>
           <p:cNvPicPr>
             <a:picLocks noChangeAspect="1"/>
           </p:cNvPicPr>
@@ -9198,7 +9753,7 @@
         </p:blipFill>
         <p:spPr>
           <a:xfrm>
-            <a:off x="4362180" y="2043399"/>
+            <a:off x="7874815" y="1898375"/>
             <a:ext cx="3337026" cy="4279141"/>
           </a:xfrm>
           <a:prstGeom prst="rect">
@@ -9206,326 +9761,10 @@
           </a:prstGeom>
         </p:spPr>
       </p:pic>
-      <p:sp>
-        <p:nvSpPr>
-          <p:cNvPr id="7" name="Shape 120"/>
-          <p:cNvSpPr txBox="1">
-            <a:spLocks/>
-          </p:cNvSpPr>
-          <p:nvPr/>
-        </p:nvSpPr>
-        <p:spPr>
-          <a:xfrm>
-            <a:off x="1798935" y="755373"/>
-            <a:ext cx="8229600" cy="1143001"/>
-          </a:xfrm>
-          <a:prstGeom prst="rect">
-            <a:avLst/>
-          </a:prstGeom>
-          <a:ln w="12700">
-            <a:miter lim="400000"/>
-          </a:ln>
-          <a:extLst>
-            <a:ext uri="{C572A759-6A51-4108-AA02-DFA0A04FC94B}">
-              <ma14:wrappingTextBoxFlag xmlns="" xmlns:ma14="http://schemas.microsoft.com/office/mac/drawingml/2011/main" val="1"/>
-            </a:ext>
-          </a:extLst>
-        </p:spPr>
-        <p:txBody>
-          <a:bodyPr lIns="45719" rIns="45719" anchor="ctr">
-            <a:normAutofit/>
-          </a:bodyPr>
-          <a:lstStyle>
-            <a:lvl1pPr marL="0" marR="0" indent="0" algn="ctr" defTabSz="914400" rtl="0" latinLnBrk="0">
-              <a:lnSpc>
-                <a:spcPct val="100000"/>
-              </a:lnSpc>
-              <a:spcBef>
-                <a:spcPts val="0"/>
-              </a:spcBef>
-              <a:spcAft>
-                <a:spcPts val="0"/>
-              </a:spcAft>
-              <a:buClrTx/>
-              <a:buSzTx/>
-              <a:buFontTx/>
-              <a:buNone/>
-              <a:tabLst/>
-              <a:defRPr sz="4400" b="0" i="0" u="none" strike="noStrike" cap="none" spc="0" baseline="0">
-                <a:ln>
-                  <a:noFill/>
-                </a:ln>
-                <a:solidFill>
-                  <a:srgbClr val="000000"/>
-                </a:solidFill>
-                <a:uFillTx/>
-                <a:latin typeface="+mn-lt"/>
-                <a:ea typeface="+mn-ea"/>
-                <a:cs typeface="+mn-cs"/>
-                <a:sym typeface="Calibri"/>
-              </a:defRPr>
-            </a:lvl1pPr>
-            <a:lvl2pPr marL="0" marR="0" indent="0" algn="ctr" defTabSz="914400" rtl="0" latinLnBrk="0">
-              <a:lnSpc>
-                <a:spcPct val="100000"/>
-              </a:lnSpc>
-              <a:spcBef>
-                <a:spcPts val="0"/>
-              </a:spcBef>
-              <a:spcAft>
-                <a:spcPts val="0"/>
-              </a:spcAft>
-              <a:buClrTx/>
-              <a:buSzTx/>
-              <a:buFontTx/>
-              <a:buNone/>
-              <a:tabLst/>
-              <a:defRPr sz="4400" b="0" i="0" u="none" strike="noStrike" cap="none" spc="0" baseline="0">
-                <a:ln>
-                  <a:noFill/>
-                </a:ln>
-                <a:solidFill>
-                  <a:srgbClr val="000000"/>
-                </a:solidFill>
-                <a:uFillTx/>
-                <a:latin typeface="+mn-lt"/>
-                <a:ea typeface="+mn-ea"/>
-                <a:cs typeface="+mn-cs"/>
-                <a:sym typeface="Calibri"/>
-              </a:defRPr>
-            </a:lvl2pPr>
-            <a:lvl3pPr marL="0" marR="0" indent="0" algn="ctr" defTabSz="914400" rtl="0" latinLnBrk="0">
-              <a:lnSpc>
-                <a:spcPct val="100000"/>
-              </a:lnSpc>
-              <a:spcBef>
-                <a:spcPts val="0"/>
-              </a:spcBef>
-              <a:spcAft>
-                <a:spcPts val="0"/>
-              </a:spcAft>
-              <a:buClrTx/>
-              <a:buSzTx/>
-              <a:buFontTx/>
-              <a:buNone/>
-              <a:tabLst/>
-              <a:defRPr sz="4400" b="0" i="0" u="none" strike="noStrike" cap="none" spc="0" baseline="0">
-                <a:ln>
-                  <a:noFill/>
-                </a:ln>
-                <a:solidFill>
-                  <a:srgbClr val="000000"/>
-                </a:solidFill>
-                <a:uFillTx/>
-                <a:latin typeface="+mn-lt"/>
-                <a:ea typeface="+mn-ea"/>
-                <a:cs typeface="+mn-cs"/>
-                <a:sym typeface="Calibri"/>
-              </a:defRPr>
-            </a:lvl3pPr>
-            <a:lvl4pPr marL="0" marR="0" indent="0" algn="ctr" defTabSz="914400" rtl="0" latinLnBrk="0">
-              <a:lnSpc>
-                <a:spcPct val="100000"/>
-              </a:lnSpc>
-              <a:spcBef>
-                <a:spcPts val="0"/>
-              </a:spcBef>
-              <a:spcAft>
-                <a:spcPts val="0"/>
-              </a:spcAft>
-              <a:buClrTx/>
-              <a:buSzTx/>
-              <a:buFontTx/>
-              <a:buNone/>
-              <a:tabLst/>
-              <a:defRPr sz="4400" b="0" i="0" u="none" strike="noStrike" cap="none" spc="0" baseline="0">
-                <a:ln>
-                  <a:noFill/>
-                </a:ln>
-                <a:solidFill>
-                  <a:srgbClr val="000000"/>
-                </a:solidFill>
-                <a:uFillTx/>
-                <a:latin typeface="+mn-lt"/>
-                <a:ea typeface="+mn-ea"/>
-                <a:cs typeface="+mn-cs"/>
-                <a:sym typeface="Calibri"/>
-              </a:defRPr>
-            </a:lvl4pPr>
-            <a:lvl5pPr marL="0" marR="0" indent="0" algn="ctr" defTabSz="914400" rtl="0" latinLnBrk="0">
-              <a:lnSpc>
-                <a:spcPct val="100000"/>
-              </a:lnSpc>
-              <a:spcBef>
-                <a:spcPts val="0"/>
-              </a:spcBef>
-              <a:spcAft>
-                <a:spcPts val="0"/>
-              </a:spcAft>
-              <a:buClrTx/>
-              <a:buSzTx/>
-              <a:buFontTx/>
-              <a:buNone/>
-              <a:tabLst/>
-              <a:defRPr sz="4400" b="0" i="0" u="none" strike="noStrike" cap="none" spc="0" baseline="0">
-                <a:ln>
-                  <a:noFill/>
-                </a:ln>
-                <a:solidFill>
-                  <a:srgbClr val="000000"/>
-                </a:solidFill>
-                <a:uFillTx/>
-                <a:latin typeface="+mn-lt"/>
-                <a:ea typeface="+mn-ea"/>
-                <a:cs typeface="+mn-cs"/>
-                <a:sym typeface="Calibri"/>
-              </a:defRPr>
-            </a:lvl5pPr>
-            <a:lvl6pPr marL="0" marR="0" indent="0" algn="ctr" defTabSz="914400" rtl="0" latinLnBrk="0">
-              <a:lnSpc>
-                <a:spcPct val="100000"/>
-              </a:lnSpc>
-              <a:spcBef>
-                <a:spcPts val="0"/>
-              </a:spcBef>
-              <a:spcAft>
-                <a:spcPts val="0"/>
-              </a:spcAft>
-              <a:buClrTx/>
-              <a:buSzTx/>
-              <a:buFontTx/>
-              <a:buNone/>
-              <a:tabLst/>
-              <a:defRPr sz="4400" b="0" i="0" u="none" strike="noStrike" cap="none" spc="0" baseline="0">
-                <a:ln>
-                  <a:noFill/>
-                </a:ln>
-                <a:solidFill>
-                  <a:srgbClr val="000000"/>
-                </a:solidFill>
-                <a:uFillTx/>
-                <a:latin typeface="+mn-lt"/>
-                <a:ea typeface="+mn-ea"/>
-                <a:cs typeface="+mn-cs"/>
-                <a:sym typeface="Calibri"/>
-              </a:defRPr>
-            </a:lvl6pPr>
-            <a:lvl7pPr marL="0" marR="0" indent="0" algn="ctr" defTabSz="914400" rtl="0" latinLnBrk="0">
-              <a:lnSpc>
-                <a:spcPct val="100000"/>
-              </a:lnSpc>
-              <a:spcBef>
-                <a:spcPts val="0"/>
-              </a:spcBef>
-              <a:spcAft>
-                <a:spcPts val="0"/>
-              </a:spcAft>
-              <a:buClrTx/>
-              <a:buSzTx/>
-              <a:buFontTx/>
-              <a:buNone/>
-              <a:tabLst/>
-              <a:defRPr sz="4400" b="0" i="0" u="none" strike="noStrike" cap="none" spc="0" baseline="0">
-                <a:ln>
-                  <a:noFill/>
-                </a:ln>
-                <a:solidFill>
-                  <a:srgbClr val="000000"/>
-                </a:solidFill>
-                <a:uFillTx/>
-                <a:latin typeface="+mn-lt"/>
-                <a:ea typeface="+mn-ea"/>
-                <a:cs typeface="+mn-cs"/>
-                <a:sym typeface="Calibri"/>
-              </a:defRPr>
-            </a:lvl7pPr>
-            <a:lvl8pPr marL="0" marR="0" indent="0" algn="ctr" defTabSz="914400" rtl="0" latinLnBrk="0">
-              <a:lnSpc>
-                <a:spcPct val="100000"/>
-              </a:lnSpc>
-              <a:spcBef>
-                <a:spcPts val="0"/>
-              </a:spcBef>
-              <a:spcAft>
-                <a:spcPts val="0"/>
-              </a:spcAft>
-              <a:buClrTx/>
-              <a:buSzTx/>
-              <a:buFontTx/>
-              <a:buNone/>
-              <a:tabLst/>
-              <a:defRPr sz="4400" b="0" i="0" u="none" strike="noStrike" cap="none" spc="0" baseline="0">
-                <a:ln>
-                  <a:noFill/>
-                </a:ln>
-                <a:solidFill>
-                  <a:srgbClr val="000000"/>
-                </a:solidFill>
-                <a:uFillTx/>
-                <a:latin typeface="+mn-lt"/>
-                <a:ea typeface="+mn-ea"/>
-                <a:cs typeface="+mn-cs"/>
-                <a:sym typeface="Calibri"/>
-              </a:defRPr>
-            </a:lvl8pPr>
-            <a:lvl9pPr marL="0" marR="0" indent="0" algn="ctr" defTabSz="914400" rtl="0" latinLnBrk="0">
-              <a:lnSpc>
-                <a:spcPct val="100000"/>
-              </a:lnSpc>
-              <a:spcBef>
-                <a:spcPts val="0"/>
-              </a:spcBef>
-              <a:spcAft>
-                <a:spcPts val="0"/>
-              </a:spcAft>
-              <a:buClrTx/>
-              <a:buSzTx/>
-              <a:buFontTx/>
-              <a:buNone/>
-              <a:tabLst/>
-              <a:defRPr sz="4400" b="0" i="0" u="none" strike="noStrike" cap="none" spc="0" baseline="0">
-                <a:ln>
-                  <a:noFill/>
-                </a:ln>
-                <a:solidFill>
-                  <a:srgbClr val="000000"/>
-                </a:solidFill>
-                <a:uFillTx/>
-                <a:latin typeface="+mn-lt"/>
-                <a:ea typeface="+mn-ea"/>
-                <a:cs typeface="+mn-cs"/>
-                <a:sym typeface="Calibri"/>
-              </a:defRPr>
-            </a:lvl9pPr>
-          </a:lstStyle>
-          <a:p>
-            <a:pPr hangingPunct="1">
-              <a:defRPr sz="2800" b="1">
-                <a:solidFill>
-                  <a:srgbClr val="11A79D"/>
-                </a:solidFill>
-              </a:defRPr>
-            </a:pPr>
-            <a:r>
-              <a:rPr lang="pt-BR" sz="5400" b="1" dirty="0" smtClean="0">
-                <a:solidFill>
-                  <a:srgbClr val="11A79D"/>
-                </a:solidFill>
-              </a:rPr>
-              <a:t>Baixo acoplamento</a:t>
-            </a:r>
-            <a:endParaRPr lang="pt-BR" sz="5400" b="1" dirty="0">
-              <a:solidFill>
-                <a:schemeClr val="tx2"/>
-              </a:solidFill>
-            </a:endParaRPr>
-          </a:p>
-        </p:txBody>
-      </p:sp>
     </p:spTree>
     <p:extLst>
       <p:ext uri="{BB962C8B-B14F-4D97-AF65-F5344CB8AC3E}">
-        <p14:creationId xmlns:p14="http://schemas.microsoft.com/office/powerpoint/2010/main" val="1074186754"/>
+        <p14:creationId xmlns:p14="http://schemas.microsoft.com/office/powerpoint/2010/main" val="1786424224"/>
       </p:ext>
     </p:extLst>
   </p:cSld>
@@ -9680,7 +9919,7 @@
           </a:ln>
           <a:extLst>
             <a:ext uri="{C572A759-6A51-4108-AA02-DFA0A04FC94B}">
-              <ma14:wrappingTextBoxFlag xmlns="" xmlns:ma14="http://schemas.microsoft.com/office/mac/drawingml/2011/main" val="1"/>
+              <ma14:wrappingTextBoxFlag xmlns:ma14="http://schemas.microsoft.com/office/mac/drawingml/2011/main" xmlns="" val="1"/>
             </a:ext>
           </a:extLst>
         </p:spPr>
@@ -9979,6 +10218,3649 @@
     <p:extLst>
       <p:ext uri="{BB962C8B-B14F-4D97-AF65-F5344CB8AC3E}">
         <p14:creationId xmlns:p14="http://schemas.microsoft.com/office/powerpoint/2010/main" val="3555402958"/>
+      </p:ext>
+    </p:extLst>
+  </p:cSld>
+  <p:clrMapOvr>
+    <a:masterClrMapping/>
+  </p:clrMapOvr>
+  <mc:AlternateContent xmlns:mc="http://schemas.openxmlformats.org/markup-compatibility/2006" xmlns:p14="http://schemas.microsoft.com/office/powerpoint/2010/main">
+    <mc:Choice Requires="p14">
+      <p:transition spd="med" p14:dur="700">
+        <p:fade/>
+      </p:transition>
+    </mc:Choice>
+    <mc:Fallback xmlns="">
+      <p:transition spd="med">
+        <p:fade/>
+      </p:transition>
+    </mc:Fallback>
+  </mc:AlternateContent>
+  <p:timing>
+    <p:tnLst>
+      <p:par>
+        <p:cTn id="1" dur="indefinite" restart="never" nodeType="tmRoot"/>
+      </p:par>
+    </p:tnLst>
+  </p:timing>
+</p:sld>
+</file>
+
+<file path=ppt/slides/slide20.xml><?xml version="1.0" encoding="utf-8"?>
+<p:sld xmlns:a="http://schemas.openxmlformats.org/drawingml/2006/main" xmlns:r="http://schemas.openxmlformats.org/officeDocument/2006/relationships" xmlns:p="http://schemas.openxmlformats.org/presentationml/2006/main">
+  <p:cSld>
+    <p:spTree>
+      <p:nvGrpSpPr>
+        <p:cNvPr id="1" name=""/>
+        <p:cNvGrpSpPr/>
+        <p:nvPr/>
+      </p:nvGrpSpPr>
+      <p:grpSpPr>
+        <a:xfrm>
+          <a:off x="0" y="0"/>
+          <a:ext cx="0" cy="0"/>
+          <a:chOff x="0" y="0"/>
+          <a:chExt cx="0" cy="0"/>
+        </a:xfrm>
+      </p:grpSpPr>
+      <p:sp>
+        <p:nvSpPr>
+          <p:cNvPr id="2" name="CaixaDeTexto 1"/>
+          <p:cNvSpPr txBox="1"/>
+          <p:nvPr/>
+        </p:nvSpPr>
+        <p:spPr>
+          <a:xfrm>
+            <a:off x="1752318" y="2345181"/>
+            <a:ext cx="8495653" cy="923328"/>
+          </a:xfrm>
+          <a:prstGeom prst="rect">
+            <a:avLst/>
+          </a:prstGeom>
+          <a:noFill/>
+          <a:ln w="12700" cap="flat">
+            <a:noFill/>
+            <a:miter lim="400000"/>
+          </a:ln>
+          <a:effectLst/>
+          <a:sp3d/>
+        </p:spPr>
+        <p:style>
+          <a:lnRef idx="0">
+            <a:scrgbClr r="0" g="0" b="0"/>
+          </a:lnRef>
+          <a:fillRef idx="0">
+            <a:scrgbClr r="0" g="0" b="0"/>
+          </a:fillRef>
+          <a:effectRef idx="0">
+            <a:scrgbClr r="0" g="0" b="0"/>
+          </a:effectRef>
+          <a:fontRef idx="none"/>
+        </p:style>
+        <p:txBody>
+          <a:bodyPr rot="0" spcFirstLastPara="1" vertOverflow="overflow" horzOverflow="overflow" vert="horz" wrap="square" lIns="45719" tIns="45719" rIns="45719" bIns="45719" numCol="1" spcCol="38100" rtlCol="0" anchor="t">
+            <a:spAutoFit/>
+          </a:bodyPr>
+          <a:lstStyle/>
+          <a:p>
+            <a:pPr lvl="8" indent="0" algn="just">
+              <a:lnSpc>
+                <a:spcPct val="150000"/>
+              </a:lnSpc>
+            </a:pPr>
+            <a:r>
+              <a:rPr lang="pt-BR" dirty="0" smtClean="0">
+                <a:solidFill>
+                  <a:srgbClr val="666666"/>
+                </a:solidFill>
+              </a:rPr>
+              <a:t>O </a:t>
+            </a:r>
+            <a:r>
+              <a:rPr lang="pt-BR" dirty="0">
+                <a:solidFill>
+                  <a:srgbClr val="666666"/>
+                </a:solidFill>
+              </a:rPr>
+              <a:t>padrão da injeção de dependência é um princípio que nos guia para injetar dependências através da inversão de </a:t>
+            </a:r>
+            <a:r>
+              <a:rPr lang="pt-BR" dirty="0" smtClean="0">
+                <a:solidFill>
+                  <a:srgbClr val="666666"/>
+                </a:solidFill>
+              </a:rPr>
+              <a:t>controle.</a:t>
+            </a:r>
+            <a:endParaRPr lang="pt-BR" b="1" u="sng" dirty="0" smtClean="0">
+              <a:solidFill>
+                <a:srgbClr val="666666"/>
+              </a:solidFill>
+            </a:endParaRPr>
+          </a:p>
+        </p:txBody>
+      </p:sp>
+      <p:sp>
+        <p:nvSpPr>
+          <p:cNvPr id="6" name="Shape 120"/>
+          <p:cNvSpPr txBox="1">
+            <a:spLocks/>
+          </p:cNvSpPr>
+          <p:nvPr/>
+        </p:nvSpPr>
+        <p:spPr>
+          <a:xfrm>
+            <a:off x="1915893" y="755374"/>
+            <a:ext cx="8229600" cy="1143001"/>
+          </a:xfrm>
+          <a:prstGeom prst="rect">
+            <a:avLst/>
+          </a:prstGeom>
+          <a:ln w="12700">
+            <a:miter lim="400000"/>
+          </a:ln>
+          <a:extLst>
+            <a:ext uri="{C572A759-6A51-4108-AA02-DFA0A04FC94B}">
+              <ma14:wrappingTextBoxFlag xmlns:ma14="http://schemas.microsoft.com/office/mac/drawingml/2011/main" xmlns="" val="1"/>
+            </a:ext>
+          </a:extLst>
+        </p:spPr>
+        <p:txBody>
+          <a:bodyPr lIns="45719" rIns="45719" anchor="ctr">
+            <a:normAutofit/>
+          </a:bodyPr>
+          <a:lstStyle>
+            <a:lvl1pPr marL="0" marR="0" indent="0" algn="ctr" defTabSz="914400" rtl="0" latinLnBrk="0">
+              <a:lnSpc>
+                <a:spcPct val="100000"/>
+              </a:lnSpc>
+              <a:spcBef>
+                <a:spcPts val="0"/>
+              </a:spcBef>
+              <a:spcAft>
+                <a:spcPts val="0"/>
+              </a:spcAft>
+              <a:buClrTx/>
+              <a:buSzTx/>
+              <a:buFontTx/>
+              <a:buNone/>
+              <a:tabLst/>
+              <a:defRPr sz="4400" b="0" i="0" u="none" strike="noStrike" cap="none" spc="0" baseline="0">
+                <a:ln>
+                  <a:noFill/>
+                </a:ln>
+                <a:solidFill>
+                  <a:srgbClr val="000000"/>
+                </a:solidFill>
+                <a:uFillTx/>
+                <a:latin typeface="+mn-lt"/>
+                <a:ea typeface="+mn-ea"/>
+                <a:cs typeface="+mn-cs"/>
+                <a:sym typeface="Calibri"/>
+              </a:defRPr>
+            </a:lvl1pPr>
+            <a:lvl2pPr marL="0" marR="0" indent="0" algn="ctr" defTabSz="914400" rtl="0" latinLnBrk="0">
+              <a:lnSpc>
+                <a:spcPct val="100000"/>
+              </a:lnSpc>
+              <a:spcBef>
+                <a:spcPts val="0"/>
+              </a:spcBef>
+              <a:spcAft>
+                <a:spcPts val="0"/>
+              </a:spcAft>
+              <a:buClrTx/>
+              <a:buSzTx/>
+              <a:buFontTx/>
+              <a:buNone/>
+              <a:tabLst/>
+              <a:defRPr sz="4400" b="0" i="0" u="none" strike="noStrike" cap="none" spc="0" baseline="0">
+                <a:ln>
+                  <a:noFill/>
+                </a:ln>
+                <a:solidFill>
+                  <a:srgbClr val="000000"/>
+                </a:solidFill>
+                <a:uFillTx/>
+                <a:latin typeface="+mn-lt"/>
+                <a:ea typeface="+mn-ea"/>
+                <a:cs typeface="+mn-cs"/>
+                <a:sym typeface="Calibri"/>
+              </a:defRPr>
+            </a:lvl2pPr>
+            <a:lvl3pPr marL="0" marR="0" indent="0" algn="ctr" defTabSz="914400" rtl="0" latinLnBrk="0">
+              <a:lnSpc>
+                <a:spcPct val="100000"/>
+              </a:lnSpc>
+              <a:spcBef>
+                <a:spcPts val="0"/>
+              </a:spcBef>
+              <a:spcAft>
+                <a:spcPts val="0"/>
+              </a:spcAft>
+              <a:buClrTx/>
+              <a:buSzTx/>
+              <a:buFontTx/>
+              <a:buNone/>
+              <a:tabLst/>
+              <a:defRPr sz="4400" b="0" i="0" u="none" strike="noStrike" cap="none" spc="0" baseline="0">
+                <a:ln>
+                  <a:noFill/>
+                </a:ln>
+                <a:solidFill>
+                  <a:srgbClr val="000000"/>
+                </a:solidFill>
+                <a:uFillTx/>
+                <a:latin typeface="+mn-lt"/>
+                <a:ea typeface="+mn-ea"/>
+                <a:cs typeface="+mn-cs"/>
+                <a:sym typeface="Calibri"/>
+              </a:defRPr>
+            </a:lvl3pPr>
+            <a:lvl4pPr marL="0" marR="0" indent="0" algn="ctr" defTabSz="914400" rtl="0" latinLnBrk="0">
+              <a:lnSpc>
+                <a:spcPct val="100000"/>
+              </a:lnSpc>
+              <a:spcBef>
+                <a:spcPts val="0"/>
+              </a:spcBef>
+              <a:spcAft>
+                <a:spcPts val="0"/>
+              </a:spcAft>
+              <a:buClrTx/>
+              <a:buSzTx/>
+              <a:buFontTx/>
+              <a:buNone/>
+              <a:tabLst/>
+              <a:defRPr sz="4400" b="0" i="0" u="none" strike="noStrike" cap="none" spc="0" baseline="0">
+                <a:ln>
+                  <a:noFill/>
+                </a:ln>
+                <a:solidFill>
+                  <a:srgbClr val="000000"/>
+                </a:solidFill>
+                <a:uFillTx/>
+                <a:latin typeface="+mn-lt"/>
+                <a:ea typeface="+mn-ea"/>
+                <a:cs typeface="+mn-cs"/>
+                <a:sym typeface="Calibri"/>
+              </a:defRPr>
+            </a:lvl4pPr>
+            <a:lvl5pPr marL="0" marR="0" indent="0" algn="ctr" defTabSz="914400" rtl="0" latinLnBrk="0">
+              <a:lnSpc>
+                <a:spcPct val="100000"/>
+              </a:lnSpc>
+              <a:spcBef>
+                <a:spcPts val="0"/>
+              </a:spcBef>
+              <a:spcAft>
+                <a:spcPts val="0"/>
+              </a:spcAft>
+              <a:buClrTx/>
+              <a:buSzTx/>
+              <a:buFontTx/>
+              <a:buNone/>
+              <a:tabLst/>
+              <a:defRPr sz="4400" b="0" i="0" u="none" strike="noStrike" cap="none" spc="0" baseline="0">
+                <a:ln>
+                  <a:noFill/>
+                </a:ln>
+                <a:solidFill>
+                  <a:srgbClr val="000000"/>
+                </a:solidFill>
+                <a:uFillTx/>
+                <a:latin typeface="+mn-lt"/>
+                <a:ea typeface="+mn-ea"/>
+                <a:cs typeface="+mn-cs"/>
+                <a:sym typeface="Calibri"/>
+              </a:defRPr>
+            </a:lvl5pPr>
+            <a:lvl6pPr marL="0" marR="0" indent="0" algn="ctr" defTabSz="914400" rtl="0" latinLnBrk="0">
+              <a:lnSpc>
+                <a:spcPct val="100000"/>
+              </a:lnSpc>
+              <a:spcBef>
+                <a:spcPts val="0"/>
+              </a:spcBef>
+              <a:spcAft>
+                <a:spcPts val="0"/>
+              </a:spcAft>
+              <a:buClrTx/>
+              <a:buSzTx/>
+              <a:buFontTx/>
+              <a:buNone/>
+              <a:tabLst/>
+              <a:defRPr sz="4400" b="0" i="0" u="none" strike="noStrike" cap="none" spc="0" baseline="0">
+                <a:ln>
+                  <a:noFill/>
+                </a:ln>
+                <a:solidFill>
+                  <a:srgbClr val="000000"/>
+                </a:solidFill>
+                <a:uFillTx/>
+                <a:latin typeface="+mn-lt"/>
+                <a:ea typeface="+mn-ea"/>
+                <a:cs typeface="+mn-cs"/>
+                <a:sym typeface="Calibri"/>
+              </a:defRPr>
+            </a:lvl6pPr>
+            <a:lvl7pPr marL="0" marR="0" indent="0" algn="ctr" defTabSz="914400" rtl="0" latinLnBrk="0">
+              <a:lnSpc>
+                <a:spcPct val="100000"/>
+              </a:lnSpc>
+              <a:spcBef>
+                <a:spcPts val="0"/>
+              </a:spcBef>
+              <a:spcAft>
+                <a:spcPts val="0"/>
+              </a:spcAft>
+              <a:buClrTx/>
+              <a:buSzTx/>
+              <a:buFontTx/>
+              <a:buNone/>
+              <a:tabLst/>
+              <a:defRPr sz="4400" b="0" i="0" u="none" strike="noStrike" cap="none" spc="0" baseline="0">
+                <a:ln>
+                  <a:noFill/>
+                </a:ln>
+                <a:solidFill>
+                  <a:srgbClr val="000000"/>
+                </a:solidFill>
+                <a:uFillTx/>
+                <a:latin typeface="+mn-lt"/>
+                <a:ea typeface="+mn-ea"/>
+                <a:cs typeface="+mn-cs"/>
+                <a:sym typeface="Calibri"/>
+              </a:defRPr>
+            </a:lvl7pPr>
+            <a:lvl8pPr marL="0" marR="0" indent="0" algn="ctr" defTabSz="914400" rtl="0" latinLnBrk="0">
+              <a:lnSpc>
+                <a:spcPct val="100000"/>
+              </a:lnSpc>
+              <a:spcBef>
+                <a:spcPts val="0"/>
+              </a:spcBef>
+              <a:spcAft>
+                <a:spcPts val="0"/>
+              </a:spcAft>
+              <a:buClrTx/>
+              <a:buSzTx/>
+              <a:buFontTx/>
+              <a:buNone/>
+              <a:tabLst/>
+              <a:defRPr sz="4400" b="0" i="0" u="none" strike="noStrike" cap="none" spc="0" baseline="0">
+                <a:ln>
+                  <a:noFill/>
+                </a:ln>
+                <a:solidFill>
+                  <a:srgbClr val="000000"/>
+                </a:solidFill>
+                <a:uFillTx/>
+                <a:latin typeface="+mn-lt"/>
+                <a:ea typeface="+mn-ea"/>
+                <a:cs typeface="+mn-cs"/>
+                <a:sym typeface="Calibri"/>
+              </a:defRPr>
+            </a:lvl8pPr>
+            <a:lvl9pPr marL="0" marR="0" indent="0" algn="ctr" defTabSz="914400" rtl="0" latinLnBrk="0">
+              <a:lnSpc>
+                <a:spcPct val="100000"/>
+              </a:lnSpc>
+              <a:spcBef>
+                <a:spcPts val="0"/>
+              </a:spcBef>
+              <a:spcAft>
+                <a:spcPts val="0"/>
+              </a:spcAft>
+              <a:buClrTx/>
+              <a:buSzTx/>
+              <a:buFontTx/>
+              <a:buNone/>
+              <a:tabLst/>
+              <a:defRPr sz="4400" b="0" i="0" u="none" strike="noStrike" cap="none" spc="0" baseline="0">
+                <a:ln>
+                  <a:noFill/>
+                </a:ln>
+                <a:solidFill>
+                  <a:srgbClr val="000000"/>
+                </a:solidFill>
+                <a:uFillTx/>
+                <a:latin typeface="+mn-lt"/>
+                <a:ea typeface="+mn-ea"/>
+                <a:cs typeface="+mn-cs"/>
+                <a:sym typeface="Calibri"/>
+              </a:defRPr>
+            </a:lvl9pPr>
+          </a:lstStyle>
+          <a:p>
+            <a:pPr hangingPunct="1">
+              <a:defRPr sz="2800" b="1">
+                <a:solidFill>
+                  <a:srgbClr val="11A79D"/>
+                </a:solidFill>
+              </a:defRPr>
+            </a:pPr>
+            <a:r>
+              <a:rPr lang="pt-BR" sz="5400" b="1" dirty="0" smtClean="0">
+                <a:solidFill>
+                  <a:srgbClr val="11A79D"/>
+                </a:solidFill>
+              </a:rPr>
+              <a:t>Inje</a:t>
+            </a:r>
+            <a:r>
+              <a:rPr lang="pt-BR" sz="5400" b="1" dirty="0" smtClean="0">
+                <a:solidFill>
+                  <a:srgbClr val="11A79D"/>
+                </a:solidFill>
+              </a:rPr>
+              <a:t>ção de dependência</a:t>
+            </a:r>
+            <a:endParaRPr lang="pt-BR" sz="5400" b="1" dirty="0">
+              <a:solidFill>
+                <a:schemeClr val="tx2"/>
+              </a:solidFill>
+            </a:endParaRPr>
+          </a:p>
+        </p:txBody>
+      </p:sp>
+      <p:sp>
+        <p:nvSpPr>
+          <p:cNvPr id="3" name="Retângulo 2"/>
+          <p:cNvSpPr/>
+          <p:nvPr/>
+        </p:nvSpPr>
+        <p:spPr>
+          <a:xfrm>
+            <a:off x="1752317" y="4154272"/>
+            <a:ext cx="2321031" cy="646329"/>
+          </a:xfrm>
+          <a:prstGeom prst="rect">
+            <a:avLst/>
+          </a:prstGeom>
+          <a:solidFill>
+            <a:srgbClr val="FFFFFF"/>
+          </a:solidFill>
+          <a:ln w="25400" cap="flat">
+            <a:solidFill>
+              <a:schemeClr val="tx1"/>
+            </a:solidFill>
+            <a:prstDash val="solid"/>
+            <a:round/>
+          </a:ln>
+          <a:effectLst>
+            <a:outerShdw blurRad="38100" dist="23000" dir="5400000" rotWithShape="0">
+              <a:srgbClr val="000000">
+                <a:alpha val="35000"/>
+              </a:srgbClr>
+            </a:outerShdw>
+          </a:effectLst>
+          <a:sp3d/>
+        </p:spPr>
+        <p:style>
+          <a:lnRef idx="0">
+            <a:scrgbClr r="0" g="0" b="0"/>
+          </a:lnRef>
+          <a:fillRef idx="0">
+            <a:scrgbClr r="0" g="0" b="0"/>
+          </a:fillRef>
+          <a:effectRef idx="0">
+            <a:scrgbClr r="0" g="0" b="0"/>
+          </a:effectRef>
+          <a:fontRef idx="none"/>
+        </p:style>
+        <p:txBody>
+          <a:bodyPr rot="0" spcFirstLastPara="1" vertOverflow="overflow" horzOverflow="overflow" vert="horz" wrap="square" lIns="45719" tIns="45719" rIns="45719" bIns="45719" numCol="1" spcCol="38100" rtlCol="0" anchor="ctr">
+            <a:spAutoFit/>
+          </a:bodyPr>
+          <a:lstStyle/>
+          <a:p>
+            <a:pPr marL="0" marR="0" indent="0" algn="ctr" defTabSz="914400" rtl="0" fontAlgn="auto" latinLnBrk="0" hangingPunct="0">
+              <a:lnSpc>
+                <a:spcPct val="100000"/>
+              </a:lnSpc>
+              <a:spcBef>
+                <a:spcPts val="0"/>
+              </a:spcBef>
+              <a:spcAft>
+                <a:spcPts val="0"/>
+              </a:spcAft>
+              <a:buClrTx/>
+              <a:buSzTx/>
+              <a:buFontTx/>
+              <a:buNone/>
+              <a:tabLst/>
+            </a:pPr>
+            <a:r>
+              <a:rPr kumimoji="0" lang="pt-BR" sz="1800" b="0" i="0" u="none" strike="noStrike" cap="none" spc="0" normalizeH="0" baseline="0" dirty="0" err="1" smtClean="0">
+                <a:ln>
+                  <a:noFill/>
+                </a:ln>
+                <a:solidFill>
+                  <a:srgbClr val="000000"/>
+                </a:solidFill>
+                <a:effectLst/>
+                <a:uFillTx/>
+                <a:latin typeface="+mn-lt"/>
+                <a:ea typeface="+mn-ea"/>
+                <a:cs typeface="+mn-cs"/>
+                <a:sym typeface="Calibri"/>
+              </a:rPr>
+              <a:t>Dependency</a:t>
+            </a:r>
+            <a:r>
+              <a:rPr kumimoji="0" lang="pt-BR" sz="1800" b="0" i="0" u="none" strike="noStrike" cap="none" spc="0" normalizeH="0" baseline="0" dirty="0" smtClean="0">
+                <a:ln>
+                  <a:noFill/>
+                </a:ln>
+                <a:solidFill>
+                  <a:srgbClr val="000000"/>
+                </a:solidFill>
+                <a:effectLst/>
+                <a:uFillTx/>
+                <a:latin typeface="+mn-lt"/>
+                <a:ea typeface="+mn-ea"/>
+                <a:cs typeface="+mn-cs"/>
+                <a:sym typeface="Calibri"/>
+              </a:rPr>
+              <a:t> </a:t>
+            </a:r>
+            <a:r>
+              <a:rPr kumimoji="0" lang="pt-BR" sz="1800" b="0" i="0" u="none" strike="noStrike" cap="none" spc="0" normalizeH="0" baseline="0" dirty="0" err="1" smtClean="0">
+                <a:ln>
+                  <a:noFill/>
+                </a:ln>
+                <a:solidFill>
+                  <a:srgbClr val="000000"/>
+                </a:solidFill>
+                <a:effectLst/>
+                <a:uFillTx/>
+                <a:latin typeface="+mn-lt"/>
+                <a:ea typeface="+mn-ea"/>
+                <a:cs typeface="+mn-cs"/>
+                <a:sym typeface="Calibri"/>
+              </a:rPr>
+              <a:t>Inversion</a:t>
+            </a:r>
+            <a:r>
+              <a:rPr kumimoji="0" lang="pt-BR" sz="1800" b="0" i="0" u="none" strike="noStrike" cap="none" spc="0" normalizeH="0" baseline="0" dirty="0" smtClean="0">
+                <a:ln>
+                  <a:noFill/>
+                </a:ln>
+                <a:solidFill>
+                  <a:srgbClr val="000000"/>
+                </a:solidFill>
+                <a:effectLst/>
+                <a:uFillTx/>
+                <a:latin typeface="+mn-lt"/>
+                <a:ea typeface="+mn-ea"/>
+                <a:cs typeface="+mn-cs"/>
+                <a:sym typeface="Calibri"/>
+              </a:rPr>
+              <a:t> </a:t>
+            </a:r>
+            <a:r>
+              <a:rPr kumimoji="0" lang="pt-BR" sz="1800" b="0" i="0" u="none" strike="noStrike" cap="none" spc="0" normalizeH="0" baseline="0" dirty="0" err="1" smtClean="0">
+                <a:ln>
+                  <a:noFill/>
+                </a:ln>
+                <a:solidFill>
+                  <a:srgbClr val="000000"/>
+                </a:solidFill>
+                <a:effectLst/>
+                <a:uFillTx/>
+                <a:latin typeface="+mn-lt"/>
+                <a:ea typeface="+mn-ea"/>
+                <a:cs typeface="+mn-cs"/>
+                <a:sym typeface="Calibri"/>
+              </a:rPr>
+              <a:t>Principle</a:t>
+            </a:r>
+            <a:r>
+              <a:rPr kumimoji="0" lang="pt-BR" sz="1800" b="0" i="0" u="none" strike="noStrike" cap="none" spc="0" normalizeH="0" baseline="0" dirty="0" smtClean="0">
+                <a:ln>
+                  <a:noFill/>
+                </a:ln>
+                <a:solidFill>
+                  <a:srgbClr val="000000"/>
+                </a:solidFill>
+                <a:effectLst/>
+                <a:uFillTx/>
+                <a:latin typeface="+mn-lt"/>
+                <a:ea typeface="+mn-ea"/>
+                <a:cs typeface="+mn-cs"/>
+                <a:sym typeface="Calibri"/>
+              </a:rPr>
+              <a:t> (DIP)</a:t>
+            </a:r>
+            <a:endParaRPr kumimoji="0" lang="pt-BR" sz="1800" b="0" i="0" u="none" strike="noStrike" cap="none" spc="0" normalizeH="0" baseline="0" dirty="0">
+              <a:ln>
+                <a:noFill/>
+              </a:ln>
+              <a:solidFill>
+                <a:srgbClr val="000000"/>
+              </a:solidFill>
+              <a:effectLst/>
+              <a:uFillTx/>
+              <a:latin typeface="+mn-lt"/>
+              <a:ea typeface="+mn-ea"/>
+              <a:cs typeface="+mn-cs"/>
+              <a:sym typeface="Calibri"/>
+            </a:endParaRPr>
+          </a:p>
+        </p:txBody>
+      </p:sp>
+      <p:sp>
+        <p:nvSpPr>
+          <p:cNvPr id="5" name="Retângulo 4"/>
+          <p:cNvSpPr/>
+          <p:nvPr/>
+        </p:nvSpPr>
+        <p:spPr>
+          <a:xfrm>
+            <a:off x="5128229" y="4157768"/>
+            <a:ext cx="1940313" cy="646329"/>
+          </a:xfrm>
+          <a:prstGeom prst="rect">
+            <a:avLst/>
+          </a:prstGeom>
+          <a:solidFill>
+            <a:srgbClr val="FFFFFF"/>
+          </a:solidFill>
+          <a:ln w="25400" cap="flat">
+            <a:solidFill>
+              <a:schemeClr val="tx1"/>
+            </a:solidFill>
+            <a:prstDash val="solid"/>
+            <a:round/>
+          </a:ln>
+          <a:effectLst>
+            <a:outerShdw blurRad="38100" dist="23000" dir="5400000" rotWithShape="0">
+              <a:srgbClr val="000000">
+                <a:alpha val="35000"/>
+              </a:srgbClr>
+            </a:outerShdw>
+          </a:effectLst>
+          <a:sp3d/>
+        </p:spPr>
+        <p:style>
+          <a:lnRef idx="0">
+            <a:scrgbClr r="0" g="0" b="0"/>
+          </a:lnRef>
+          <a:fillRef idx="0">
+            <a:scrgbClr r="0" g="0" b="0"/>
+          </a:fillRef>
+          <a:effectRef idx="0">
+            <a:scrgbClr r="0" g="0" b="0"/>
+          </a:effectRef>
+          <a:fontRef idx="none"/>
+        </p:style>
+        <p:txBody>
+          <a:bodyPr rot="0" spcFirstLastPara="1" vertOverflow="overflow" horzOverflow="overflow" vert="horz" wrap="square" lIns="45719" tIns="45719" rIns="45719" bIns="45719" numCol="1" spcCol="38100" rtlCol="0" anchor="ctr">
+            <a:spAutoFit/>
+          </a:bodyPr>
+          <a:lstStyle/>
+          <a:p>
+            <a:pPr marL="0" marR="0" indent="0" algn="ctr" defTabSz="914400" rtl="0" fontAlgn="auto" latinLnBrk="0" hangingPunct="0">
+              <a:lnSpc>
+                <a:spcPct val="100000"/>
+              </a:lnSpc>
+              <a:spcBef>
+                <a:spcPts val="0"/>
+              </a:spcBef>
+              <a:spcAft>
+                <a:spcPts val="0"/>
+              </a:spcAft>
+              <a:buClrTx/>
+              <a:buSzTx/>
+              <a:buFontTx/>
+              <a:buNone/>
+              <a:tabLst/>
+            </a:pPr>
+            <a:r>
+              <a:rPr kumimoji="0" lang="pt-BR" sz="1800" b="0" i="0" u="none" strike="noStrike" cap="none" spc="0" normalizeH="0" baseline="0" dirty="0" err="1" smtClean="0">
+                <a:ln>
+                  <a:noFill/>
+                </a:ln>
+                <a:solidFill>
+                  <a:srgbClr val="000000"/>
+                </a:solidFill>
+                <a:effectLst/>
+                <a:uFillTx/>
+                <a:latin typeface="+mn-lt"/>
+                <a:ea typeface="+mn-ea"/>
+                <a:cs typeface="+mn-cs"/>
+                <a:sym typeface="Calibri"/>
+              </a:rPr>
+              <a:t>Inversion</a:t>
+            </a:r>
+            <a:r>
+              <a:rPr kumimoji="0" lang="pt-BR" sz="1800" b="0" i="0" u="none" strike="noStrike" cap="none" spc="0" normalizeH="0" dirty="0" smtClean="0">
+                <a:ln>
+                  <a:noFill/>
+                </a:ln>
+                <a:solidFill>
+                  <a:srgbClr val="000000"/>
+                </a:solidFill>
+                <a:effectLst/>
+                <a:uFillTx/>
+                <a:latin typeface="+mn-lt"/>
+                <a:ea typeface="+mn-ea"/>
+                <a:cs typeface="+mn-cs"/>
+                <a:sym typeface="Calibri"/>
+              </a:rPr>
+              <a:t> </a:t>
+            </a:r>
+            <a:r>
+              <a:rPr kumimoji="0" lang="pt-BR" sz="1800" b="0" i="0" u="none" strike="noStrike" cap="none" spc="0" normalizeH="0" dirty="0" err="1" smtClean="0">
+                <a:ln>
+                  <a:noFill/>
+                </a:ln>
+                <a:solidFill>
+                  <a:srgbClr val="000000"/>
+                </a:solidFill>
+                <a:effectLst/>
+                <a:uFillTx/>
+                <a:latin typeface="+mn-lt"/>
+                <a:ea typeface="+mn-ea"/>
+                <a:cs typeface="+mn-cs"/>
+                <a:sym typeface="Calibri"/>
+              </a:rPr>
+              <a:t>of</a:t>
+            </a:r>
+            <a:r>
+              <a:rPr kumimoji="0" lang="pt-BR" sz="1800" b="0" i="0" u="none" strike="noStrike" cap="none" spc="0" normalizeH="0" dirty="0" smtClean="0">
+                <a:ln>
+                  <a:noFill/>
+                </a:ln>
+                <a:solidFill>
+                  <a:srgbClr val="000000"/>
+                </a:solidFill>
+                <a:effectLst/>
+                <a:uFillTx/>
+                <a:latin typeface="+mn-lt"/>
+                <a:ea typeface="+mn-ea"/>
+                <a:cs typeface="+mn-cs"/>
+                <a:sym typeface="Calibri"/>
+              </a:rPr>
+              <a:t> </a:t>
+            </a:r>
+            <a:r>
+              <a:rPr kumimoji="0" lang="pt-BR" sz="1800" b="0" i="0" u="none" strike="noStrike" cap="none" spc="0" normalizeH="0" dirty="0" err="1" smtClean="0">
+                <a:ln>
+                  <a:noFill/>
+                </a:ln>
+                <a:solidFill>
+                  <a:srgbClr val="000000"/>
+                </a:solidFill>
+                <a:effectLst/>
+                <a:uFillTx/>
+                <a:latin typeface="+mn-lt"/>
+                <a:ea typeface="+mn-ea"/>
+                <a:cs typeface="+mn-cs"/>
+                <a:sym typeface="Calibri"/>
+              </a:rPr>
+              <a:t>Control</a:t>
+            </a:r>
+            <a:r>
+              <a:rPr kumimoji="0" lang="pt-BR" sz="1800" b="0" i="0" u="none" strike="noStrike" cap="none" spc="0" normalizeH="0" dirty="0" smtClean="0">
+                <a:ln>
+                  <a:noFill/>
+                </a:ln>
+                <a:solidFill>
+                  <a:srgbClr val="000000"/>
+                </a:solidFill>
+                <a:effectLst/>
+                <a:uFillTx/>
+                <a:latin typeface="+mn-lt"/>
+                <a:ea typeface="+mn-ea"/>
+                <a:cs typeface="+mn-cs"/>
+                <a:sym typeface="Calibri"/>
+              </a:rPr>
+              <a:t> (</a:t>
+            </a:r>
+            <a:r>
+              <a:rPr kumimoji="0" lang="pt-BR" sz="1800" b="0" i="0" u="none" strike="noStrike" cap="none" spc="0" normalizeH="0" dirty="0" err="1" smtClean="0">
+                <a:ln>
+                  <a:noFill/>
+                </a:ln>
+                <a:solidFill>
+                  <a:srgbClr val="000000"/>
+                </a:solidFill>
+                <a:effectLst/>
+                <a:uFillTx/>
+                <a:latin typeface="+mn-lt"/>
+                <a:ea typeface="+mn-ea"/>
+                <a:cs typeface="+mn-cs"/>
+                <a:sym typeface="Calibri"/>
+              </a:rPr>
+              <a:t>IoC</a:t>
+            </a:r>
+            <a:r>
+              <a:rPr kumimoji="0" lang="pt-BR" sz="1800" b="0" i="0" u="none" strike="noStrike" cap="none" spc="0" normalizeH="0" dirty="0" smtClean="0">
+                <a:ln>
+                  <a:noFill/>
+                </a:ln>
+                <a:solidFill>
+                  <a:srgbClr val="000000"/>
+                </a:solidFill>
+                <a:effectLst/>
+                <a:uFillTx/>
+                <a:latin typeface="+mn-lt"/>
+                <a:ea typeface="+mn-ea"/>
+                <a:cs typeface="+mn-cs"/>
+                <a:sym typeface="Calibri"/>
+              </a:rPr>
+              <a:t>)</a:t>
+            </a:r>
+            <a:endParaRPr kumimoji="0" lang="pt-BR" sz="1800" b="0" i="0" u="none" strike="noStrike" cap="none" spc="0" normalizeH="0" baseline="0" dirty="0">
+              <a:ln>
+                <a:noFill/>
+              </a:ln>
+              <a:solidFill>
+                <a:srgbClr val="000000"/>
+              </a:solidFill>
+              <a:effectLst/>
+              <a:uFillTx/>
+              <a:latin typeface="+mn-lt"/>
+              <a:ea typeface="+mn-ea"/>
+              <a:cs typeface="+mn-cs"/>
+              <a:sym typeface="Calibri"/>
+            </a:endParaRPr>
+          </a:p>
+        </p:txBody>
+      </p:sp>
+      <p:sp>
+        <p:nvSpPr>
+          <p:cNvPr id="7" name="Retângulo 6"/>
+          <p:cNvSpPr/>
+          <p:nvPr/>
+        </p:nvSpPr>
+        <p:spPr>
+          <a:xfrm>
+            <a:off x="8285355" y="4157768"/>
+            <a:ext cx="1940313" cy="646329"/>
+          </a:xfrm>
+          <a:prstGeom prst="rect">
+            <a:avLst/>
+          </a:prstGeom>
+          <a:solidFill>
+            <a:srgbClr val="FFFFFF"/>
+          </a:solidFill>
+          <a:ln w="25400" cap="flat">
+            <a:solidFill>
+              <a:schemeClr val="tx1"/>
+            </a:solidFill>
+            <a:prstDash val="solid"/>
+            <a:round/>
+          </a:ln>
+          <a:effectLst>
+            <a:outerShdw blurRad="38100" dist="23000" dir="5400000" rotWithShape="0">
+              <a:srgbClr val="000000">
+                <a:alpha val="35000"/>
+              </a:srgbClr>
+            </a:outerShdw>
+          </a:effectLst>
+          <a:sp3d/>
+        </p:spPr>
+        <p:style>
+          <a:lnRef idx="0">
+            <a:scrgbClr r="0" g="0" b="0"/>
+          </a:lnRef>
+          <a:fillRef idx="0">
+            <a:scrgbClr r="0" g="0" b="0"/>
+          </a:fillRef>
+          <a:effectRef idx="0">
+            <a:scrgbClr r="0" g="0" b="0"/>
+          </a:effectRef>
+          <a:fontRef idx="none"/>
+        </p:style>
+        <p:txBody>
+          <a:bodyPr rot="0" spcFirstLastPara="1" vertOverflow="overflow" horzOverflow="overflow" vert="horz" wrap="square" lIns="45719" tIns="45719" rIns="45719" bIns="45719" numCol="1" spcCol="38100" rtlCol="0" anchor="ctr">
+            <a:spAutoFit/>
+          </a:bodyPr>
+          <a:lstStyle/>
+          <a:p>
+            <a:pPr marL="0" marR="0" indent="0" algn="ctr" defTabSz="914400" rtl="0" fontAlgn="auto" latinLnBrk="0" hangingPunct="0">
+              <a:lnSpc>
+                <a:spcPct val="100000"/>
+              </a:lnSpc>
+              <a:spcBef>
+                <a:spcPts val="0"/>
+              </a:spcBef>
+              <a:spcAft>
+                <a:spcPts val="0"/>
+              </a:spcAft>
+              <a:buClrTx/>
+              <a:buSzTx/>
+              <a:buFontTx/>
+              <a:buNone/>
+              <a:tabLst/>
+            </a:pPr>
+            <a:r>
+              <a:rPr kumimoji="0" lang="pt-BR" sz="1800" b="0" i="0" u="none" strike="noStrike" cap="none" spc="0" normalizeH="0" baseline="0" dirty="0" err="1" smtClean="0">
+                <a:ln>
+                  <a:noFill/>
+                </a:ln>
+                <a:solidFill>
+                  <a:srgbClr val="000000"/>
+                </a:solidFill>
+                <a:effectLst/>
+                <a:uFillTx/>
+                <a:latin typeface="+mn-lt"/>
+                <a:ea typeface="+mn-ea"/>
+                <a:cs typeface="+mn-cs"/>
+                <a:sym typeface="Calibri"/>
+              </a:rPr>
+              <a:t>Dependency</a:t>
+            </a:r>
+            <a:r>
+              <a:rPr kumimoji="0" lang="pt-BR" sz="1800" b="0" i="0" u="none" strike="noStrike" cap="none" spc="0" normalizeH="0" baseline="0" dirty="0" smtClean="0">
+                <a:ln>
+                  <a:noFill/>
+                </a:ln>
+                <a:solidFill>
+                  <a:srgbClr val="000000"/>
+                </a:solidFill>
+                <a:effectLst/>
+                <a:uFillTx/>
+                <a:latin typeface="+mn-lt"/>
+                <a:ea typeface="+mn-ea"/>
+                <a:cs typeface="+mn-cs"/>
+                <a:sym typeface="Calibri"/>
+              </a:rPr>
+              <a:t> </a:t>
+            </a:r>
+            <a:r>
+              <a:rPr kumimoji="0" lang="pt-BR" sz="1800" b="0" i="0" u="none" strike="noStrike" cap="none" spc="0" normalizeH="0" baseline="0" dirty="0" err="1" smtClean="0">
+                <a:ln>
+                  <a:noFill/>
+                </a:ln>
+                <a:solidFill>
+                  <a:srgbClr val="000000"/>
+                </a:solidFill>
+                <a:effectLst/>
+                <a:uFillTx/>
+                <a:latin typeface="+mn-lt"/>
+                <a:ea typeface="+mn-ea"/>
+                <a:cs typeface="+mn-cs"/>
+                <a:sym typeface="Calibri"/>
+              </a:rPr>
+              <a:t>Injection</a:t>
+            </a:r>
+            <a:r>
+              <a:rPr kumimoji="0" lang="pt-BR" sz="1800" b="0" i="0" u="none" strike="noStrike" cap="none" spc="0" normalizeH="0" dirty="0" smtClean="0">
+                <a:ln>
+                  <a:noFill/>
+                </a:ln>
+                <a:solidFill>
+                  <a:srgbClr val="000000"/>
+                </a:solidFill>
+                <a:effectLst/>
+                <a:uFillTx/>
+                <a:latin typeface="+mn-lt"/>
+                <a:ea typeface="+mn-ea"/>
+                <a:cs typeface="+mn-cs"/>
+                <a:sym typeface="Calibri"/>
+              </a:rPr>
+              <a:t> (DI)</a:t>
+            </a:r>
+            <a:endParaRPr kumimoji="0" lang="pt-BR" sz="1800" b="0" i="0" u="none" strike="noStrike" cap="none" spc="0" normalizeH="0" baseline="0" dirty="0">
+              <a:ln>
+                <a:noFill/>
+              </a:ln>
+              <a:solidFill>
+                <a:srgbClr val="000000"/>
+              </a:solidFill>
+              <a:effectLst/>
+              <a:uFillTx/>
+              <a:latin typeface="+mn-lt"/>
+              <a:ea typeface="+mn-ea"/>
+              <a:cs typeface="+mn-cs"/>
+              <a:sym typeface="Calibri"/>
+            </a:endParaRPr>
+          </a:p>
+        </p:txBody>
+      </p:sp>
+      <p:cxnSp>
+        <p:nvCxnSpPr>
+          <p:cNvPr id="8" name="Conector de seta reta 7"/>
+          <p:cNvCxnSpPr>
+            <a:stCxn id="3" idx="3"/>
+            <a:endCxn id="5" idx="1"/>
+          </p:cNvCxnSpPr>
+          <p:nvPr/>
+        </p:nvCxnSpPr>
+        <p:spPr>
+          <a:xfrm>
+            <a:off x="4073348" y="4477437"/>
+            <a:ext cx="1054881" cy="3496"/>
+          </a:xfrm>
+          <a:prstGeom prst="straightConnector1">
+            <a:avLst/>
+          </a:prstGeom>
+          <a:noFill/>
+          <a:ln w="25400" cap="flat">
+            <a:solidFill>
+              <a:schemeClr val="tx1"/>
+            </a:solidFill>
+            <a:prstDash val="solid"/>
+            <a:round/>
+            <a:tailEnd type="arrow"/>
+          </a:ln>
+          <a:effectLst>
+            <a:outerShdw blurRad="38100" dist="20000" dir="5400000" rotWithShape="0">
+              <a:srgbClr val="000000">
+                <a:alpha val="38000"/>
+              </a:srgbClr>
+            </a:outerShdw>
+          </a:effectLst>
+          <a:sp3d/>
+        </p:spPr>
+        <p:style>
+          <a:lnRef idx="0">
+            <a:scrgbClr r="0" g="0" b="0"/>
+          </a:lnRef>
+          <a:fillRef idx="0">
+            <a:scrgbClr r="0" g="0" b="0"/>
+          </a:fillRef>
+          <a:effectRef idx="0">
+            <a:scrgbClr r="0" g="0" b="0"/>
+          </a:effectRef>
+          <a:fontRef idx="none"/>
+        </p:style>
+      </p:cxnSp>
+      <p:cxnSp>
+        <p:nvCxnSpPr>
+          <p:cNvPr id="10" name="Conector de seta reta 9"/>
+          <p:cNvCxnSpPr>
+            <a:stCxn id="5" idx="3"/>
+            <a:endCxn id="7" idx="1"/>
+          </p:cNvCxnSpPr>
+          <p:nvPr/>
+        </p:nvCxnSpPr>
+        <p:spPr>
+          <a:xfrm>
+            <a:off x="7068542" y="4480933"/>
+            <a:ext cx="1216813" cy="0"/>
+          </a:xfrm>
+          <a:prstGeom prst="straightConnector1">
+            <a:avLst/>
+          </a:prstGeom>
+          <a:noFill/>
+          <a:ln w="25400" cap="flat">
+            <a:solidFill>
+              <a:schemeClr val="tx1"/>
+            </a:solidFill>
+            <a:prstDash val="solid"/>
+            <a:round/>
+            <a:tailEnd type="arrow"/>
+          </a:ln>
+          <a:effectLst>
+            <a:outerShdw blurRad="38100" dist="20000" dir="5400000" rotWithShape="0">
+              <a:srgbClr val="000000">
+                <a:alpha val="38000"/>
+              </a:srgbClr>
+            </a:outerShdw>
+          </a:effectLst>
+          <a:sp3d/>
+        </p:spPr>
+        <p:style>
+          <a:lnRef idx="0">
+            <a:scrgbClr r="0" g="0" b="0"/>
+          </a:lnRef>
+          <a:fillRef idx="0">
+            <a:scrgbClr r="0" g="0" b="0"/>
+          </a:fillRef>
+          <a:effectRef idx="0">
+            <a:scrgbClr r="0" g="0" b="0"/>
+          </a:effectRef>
+          <a:fontRef idx="none"/>
+        </p:style>
+      </p:cxnSp>
+    </p:spTree>
+    <p:extLst>
+      <p:ext uri="{BB962C8B-B14F-4D97-AF65-F5344CB8AC3E}">
+        <p14:creationId xmlns:p14="http://schemas.microsoft.com/office/powerpoint/2010/main" val="3212269014"/>
+      </p:ext>
+    </p:extLst>
+  </p:cSld>
+  <p:clrMapOvr>
+    <a:masterClrMapping/>
+  </p:clrMapOvr>
+  <mc:AlternateContent xmlns:mc="http://schemas.openxmlformats.org/markup-compatibility/2006" xmlns:p14="http://schemas.microsoft.com/office/powerpoint/2010/main">
+    <mc:Choice Requires="p14">
+      <p:transition spd="med" p14:dur="700">
+        <p:fade/>
+      </p:transition>
+    </mc:Choice>
+    <mc:Fallback xmlns="">
+      <p:transition spd="med">
+        <p:fade/>
+      </p:transition>
+    </mc:Fallback>
+  </mc:AlternateContent>
+  <p:timing>
+    <p:tnLst>
+      <p:par>
+        <p:cTn id="1" dur="indefinite" restart="never" nodeType="tmRoot"/>
+      </p:par>
+    </p:tnLst>
+  </p:timing>
+</p:sld>
+</file>
+
+<file path=ppt/slides/slide21.xml><?xml version="1.0" encoding="utf-8"?>
+<p:sld xmlns:a="http://schemas.openxmlformats.org/drawingml/2006/main" xmlns:r="http://schemas.openxmlformats.org/officeDocument/2006/relationships" xmlns:p="http://schemas.openxmlformats.org/presentationml/2006/main">
+  <p:cSld>
+    <p:spTree>
+      <p:nvGrpSpPr>
+        <p:cNvPr id="1" name=""/>
+        <p:cNvGrpSpPr/>
+        <p:nvPr/>
+      </p:nvGrpSpPr>
+      <p:grpSpPr>
+        <a:xfrm>
+          <a:off x="0" y="0"/>
+          <a:ext cx="0" cy="0"/>
+          <a:chOff x="0" y="0"/>
+          <a:chExt cx="0" cy="0"/>
+        </a:xfrm>
+      </p:grpSpPr>
+      <p:sp>
+        <p:nvSpPr>
+          <p:cNvPr id="2" name="CaixaDeTexto 1"/>
+          <p:cNvSpPr txBox="1"/>
+          <p:nvPr/>
+        </p:nvSpPr>
+        <p:spPr>
+          <a:xfrm>
+            <a:off x="1752318" y="2345181"/>
+            <a:ext cx="8495653" cy="2169823"/>
+          </a:xfrm>
+          <a:prstGeom prst="rect">
+            <a:avLst/>
+          </a:prstGeom>
+          <a:noFill/>
+          <a:ln w="12700" cap="flat">
+            <a:noFill/>
+            <a:miter lim="400000"/>
+          </a:ln>
+          <a:effectLst/>
+          <a:sp3d/>
+        </p:spPr>
+        <p:style>
+          <a:lnRef idx="0">
+            <a:scrgbClr r="0" g="0" b="0"/>
+          </a:lnRef>
+          <a:fillRef idx="0">
+            <a:scrgbClr r="0" g="0" b="0"/>
+          </a:fillRef>
+          <a:effectRef idx="0">
+            <a:scrgbClr r="0" g="0" b="0"/>
+          </a:effectRef>
+          <a:fontRef idx="none"/>
+        </p:style>
+        <p:txBody>
+          <a:bodyPr rot="0" spcFirstLastPara="1" vertOverflow="overflow" horzOverflow="overflow" vert="horz" wrap="square" lIns="45719" tIns="45719" rIns="45719" bIns="45719" numCol="1" spcCol="38100" rtlCol="0" anchor="t">
+            <a:spAutoFit/>
+          </a:bodyPr>
+          <a:lstStyle/>
+          <a:p>
+            <a:pPr lvl="8" indent="0" algn="just">
+              <a:lnSpc>
+                <a:spcPct val="150000"/>
+              </a:lnSpc>
+            </a:pPr>
+            <a:r>
+              <a:rPr lang="pt-BR" dirty="0">
+                <a:solidFill>
+                  <a:srgbClr val="666666"/>
+                </a:solidFill>
+              </a:rPr>
+              <a:t>A injeção de dependência(DI) é um padrão de projeto cujo objetivo é manter um baixo acoplamento entre diferentes módulos de um sistema. Nesta solução as dependências entre os módulos não são definidas programaticamente, mas sim pela configuração de uma infraestrutura de software (container) que é responsável por "injetar" em cada componente suas dependências declaradas</a:t>
+            </a:r>
+            <a:r>
+              <a:rPr lang="pt-BR" dirty="0" smtClean="0">
+                <a:solidFill>
+                  <a:srgbClr val="666666"/>
+                </a:solidFill>
+              </a:rPr>
+              <a:t>.</a:t>
+            </a:r>
+            <a:endParaRPr lang="pt-BR" b="1" u="sng" dirty="0" smtClean="0">
+              <a:solidFill>
+                <a:srgbClr val="666666"/>
+              </a:solidFill>
+            </a:endParaRPr>
+          </a:p>
+        </p:txBody>
+      </p:sp>
+      <p:sp>
+        <p:nvSpPr>
+          <p:cNvPr id="6" name="Shape 120"/>
+          <p:cNvSpPr txBox="1">
+            <a:spLocks/>
+          </p:cNvSpPr>
+          <p:nvPr/>
+        </p:nvSpPr>
+        <p:spPr>
+          <a:xfrm>
+            <a:off x="1915893" y="755374"/>
+            <a:ext cx="8229600" cy="1143001"/>
+          </a:xfrm>
+          <a:prstGeom prst="rect">
+            <a:avLst/>
+          </a:prstGeom>
+          <a:ln w="12700">
+            <a:miter lim="400000"/>
+          </a:ln>
+          <a:extLst>
+            <a:ext uri="{C572A759-6A51-4108-AA02-DFA0A04FC94B}">
+              <ma14:wrappingTextBoxFlag xmlns:ma14="http://schemas.microsoft.com/office/mac/drawingml/2011/main" xmlns="" val="1"/>
+            </a:ext>
+          </a:extLst>
+        </p:spPr>
+        <p:txBody>
+          <a:bodyPr lIns="45719" rIns="45719" anchor="ctr">
+            <a:normAutofit/>
+          </a:bodyPr>
+          <a:lstStyle>
+            <a:lvl1pPr marL="0" marR="0" indent="0" algn="ctr" defTabSz="914400" rtl="0" latinLnBrk="0">
+              <a:lnSpc>
+                <a:spcPct val="100000"/>
+              </a:lnSpc>
+              <a:spcBef>
+                <a:spcPts val="0"/>
+              </a:spcBef>
+              <a:spcAft>
+                <a:spcPts val="0"/>
+              </a:spcAft>
+              <a:buClrTx/>
+              <a:buSzTx/>
+              <a:buFontTx/>
+              <a:buNone/>
+              <a:tabLst/>
+              <a:defRPr sz="4400" b="0" i="0" u="none" strike="noStrike" cap="none" spc="0" baseline="0">
+                <a:ln>
+                  <a:noFill/>
+                </a:ln>
+                <a:solidFill>
+                  <a:srgbClr val="000000"/>
+                </a:solidFill>
+                <a:uFillTx/>
+                <a:latin typeface="+mn-lt"/>
+                <a:ea typeface="+mn-ea"/>
+                <a:cs typeface="+mn-cs"/>
+                <a:sym typeface="Calibri"/>
+              </a:defRPr>
+            </a:lvl1pPr>
+            <a:lvl2pPr marL="0" marR="0" indent="0" algn="ctr" defTabSz="914400" rtl="0" latinLnBrk="0">
+              <a:lnSpc>
+                <a:spcPct val="100000"/>
+              </a:lnSpc>
+              <a:spcBef>
+                <a:spcPts val="0"/>
+              </a:spcBef>
+              <a:spcAft>
+                <a:spcPts val="0"/>
+              </a:spcAft>
+              <a:buClrTx/>
+              <a:buSzTx/>
+              <a:buFontTx/>
+              <a:buNone/>
+              <a:tabLst/>
+              <a:defRPr sz="4400" b="0" i="0" u="none" strike="noStrike" cap="none" spc="0" baseline="0">
+                <a:ln>
+                  <a:noFill/>
+                </a:ln>
+                <a:solidFill>
+                  <a:srgbClr val="000000"/>
+                </a:solidFill>
+                <a:uFillTx/>
+                <a:latin typeface="+mn-lt"/>
+                <a:ea typeface="+mn-ea"/>
+                <a:cs typeface="+mn-cs"/>
+                <a:sym typeface="Calibri"/>
+              </a:defRPr>
+            </a:lvl2pPr>
+            <a:lvl3pPr marL="0" marR="0" indent="0" algn="ctr" defTabSz="914400" rtl="0" latinLnBrk="0">
+              <a:lnSpc>
+                <a:spcPct val="100000"/>
+              </a:lnSpc>
+              <a:spcBef>
+                <a:spcPts val="0"/>
+              </a:spcBef>
+              <a:spcAft>
+                <a:spcPts val="0"/>
+              </a:spcAft>
+              <a:buClrTx/>
+              <a:buSzTx/>
+              <a:buFontTx/>
+              <a:buNone/>
+              <a:tabLst/>
+              <a:defRPr sz="4400" b="0" i="0" u="none" strike="noStrike" cap="none" spc="0" baseline="0">
+                <a:ln>
+                  <a:noFill/>
+                </a:ln>
+                <a:solidFill>
+                  <a:srgbClr val="000000"/>
+                </a:solidFill>
+                <a:uFillTx/>
+                <a:latin typeface="+mn-lt"/>
+                <a:ea typeface="+mn-ea"/>
+                <a:cs typeface="+mn-cs"/>
+                <a:sym typeface="Calibri"/>
+              </a:defRPr>
+            </a:lvl3pPr>
+            <a:lvl4pPr marL="0" marR="0" indent="0" algn="ctr" defTabSz="914400" rtl="0" latinLnBrk="0">
+              <a:lnSpc>
+                <a:spcPct val="100000"/>
+              </a:lnSpc>
+              <a:spcBef>
+                <a:spcPts val="0"/>
+              </a:spcBef>
+              <a:spcAft>
+                <a:spcPts val="0"/>
+              </a:spcAft>
+              <a:buClrTx/>
+              <a:buSzTx/>
+              <a:buFontTx/>
+              <a:buNone/>
+              <a:tabLst/>
+              <a:defRPr sz="4400" b="0" i="0" u="none" strike="noStrike" cap="none" spc="0" baseline="0">
+                <a:ln>
+                  <a:noFill/>
+                </a:ln>
+                <a:solidFill>
+                  <a:srgbClr val="000000"/>
+                </a:solidFill>
+                <a:uFillTx/>
+                <a:latin typeface="+mn-lt"/>
+                <a:ea typeface="+mn-ea"/>
+                <a:cs typeface="+mn-cs"/>
+                <a:sym typeface="Calibri"/>
+              </a:defRPr>
+            </a:lvl4pPr>
+            <a:lvl5pPr marL="0" marR="0" indent="0" algn="ctr" defTabSz="914400" rtl="0" latinLnBrk="0">
+              <a:lnSpc>
+                <a:spcPct val="100000"/>
+              </a:lnSpc>
+              <a:spcBef>
+                <a:spcPts val="0"/>
+              </a:spcBef>
+              <a:spcAft>
+                <a:spcPts val="0"/>
+              </a:spcAft>
+              <a:buClrTx/>
+              <a:buSzTx/>
+              <a:buFontTx/>
+              <a:buNone/>
+              <a:tabLst/>
+              <a:defRPr sz="4400" b="0" i="0" u="none" strike="noStrike" cap="none" spc="0" baseline="0">
+                <a:ln>
+                  <a:noFill/>
+                </a:ln>
+                <a:solidFill>
+                  <a:srgbClr val="000000"/>
+                </a:solidFill>
+                <a:uFillTx/>
+                <a:latin typeface="+mn-lt"/>
+                <a:ea typeface="+mn-ea"/>
+                <a:cs typeface="+mn-cs"/>
+                <a:sym typeface="Calibri"/>
+              </a:defRPr>
+            </a:lvl5pPr>
+            <a:lvl6pPr marL="0" marR="0" indent="0" algn="ctr" defTabSz="914400" rtl="0" latinLnBrk="0">
+              <a:lnSpc>
+                <a:spcPct val="100000"/>
+              </a:lnSpc>
+              <a:spcBef>
+                <a:spcPts val="0"/>
+              </a:spcBef>
+              <a:spcAft>
+                <a:spcPts val="0"/>
+              </a:spcAft>
+              <a:buClrTx/>
+              <a:buSzTx/>
+              <a:buFontTx/>
+              <a:buNone/>
+              <a:tabLst/>
+              <a:defRPr sz="4400" b="0" i="0" u="none" strike="noStrike" cap="none" spc="0" baseline="0">
+                <a:ln>
+                  <a:noFill/>
+                </a:ln>
+                <a:solidFill>
+                  <a:srgbClr val="000000"/>
+                </a:solidFill>
+                <a:uFillTx/>
+                <a:latin typeface="+mn-lt"/>
+                <a:ea typeface="+mn-ea"/>
+                <a:cs typeface="+mn-cs"/>
+                <a:sym typeface="Calibri"/>
+              </a:defRPr>
+            </a:lvl6pPr>
+            <a:lvl7pPr marL="0" marR="0" indent="0" algn="ctr" defTabSz="914400" rtl="0" latinLnBrk="0">
+              <a:lnSpc>
+                <a:spcPct val="100000"/>
+              </a:lnSpc>
+              <a:spcBef>
+                <a:spcPts val="0"/>
+              </a:spcBef>
+              <a:spcAft>
+                <a:spcPts val="0"/>
+              </a:spcAft>
+              <a:buClrTx/>
+              <a:buSzTx/>
+              <a:buFontTx/>
+              <a:buNone/>
+              <a:tabLst/>
+              <a:defRPr sz="4400" b="0" i="0" u="none" strike="noStrike" cap="none" spc="0" baseline="0">
+                <a:ln>
+                  <a:noFill/>
+                </a:ln>
+                <a:solidFill>
+                  <a:srgbClr val="000000"/>
+                </a:solidFill>
+                <a:uFillTx/>
+                <a:latin typeface="+mn-lt"/>
+                <a:ea typeface="+mn-ea"/>
+                <a:cs typeface="+mn-cs"/>
+                <a:sym typeface="Calibri"/>
+              </a:defRPr>
+            </a:lvl7pPr>
+            <a:lvl8pPr marL="0" marR="0" indent="0" algn="ctr" defTabSz="914400" rtl="0" latinLnBrk="0">
+              <a:lnSpc>
+                <a:spcPct val="100000"/>
+              </a:lnSpc>
+              <a:spcBef>
+                <a:spcPts val="0"/>
+              </a:spcBef>
+              <a:spcAft>
+                <a:spcPts val="0"/>
+              </a:spcAft>
+              <a:buClrTx/>
+              <a:buSzTx/>
+              <a:buFontTx/>
+              <a:buNone/>
+              <a:tabLst/>
+              <a:defRPr sz="4400" b="0" i="0" u="none" strike="noStrike" cap="none" spc="0" baseline="0">
+                <a:ln>
+                  <a:noFill/>
+                </a:ln>
+                <a:solidFill>
+                  <a:srgbClr val="000000"/>
+                </a:solidFill>
+                <a:uFillTx/>
+                <a:latin typeface="+mn-lt"/>
+                <a:ea typeface="+mn-ea"/>
+                <a:cs typeface="+mn-cs"/>
+                <a:sym typeface="Calibri"/>
+              </a:defRPr>
+            </a:lvl8pPr>
+            <a:lvl9pPr marL="0" marR="0" indent="0" algn="ctr" defTabSz="914400" rtl="0" latinLnBrk="0">
+              <a:lnSpc>
+                <a:spcPct val="100000"/>
+              </a:lnSpc>
+              <a:spcBef>
+                <a:spcPts val="0"/>
+              </a:spcBef>
+              <a:spcAft>
+                <a:spcPts val="0"/>
+              </a:spcAft>
+              <a:buClrTx/>
+              <a:buSzTx/>
+              <a:buFontTx/>
+              <a:buNone/>
+              <a:tabLst/>
+              <a:defRPr sz="4400" b="0" i="0" u="none" strike="noStrike" cap="none" spc="0" baseline="0">
+                <a:ln>
+                  <a:noFill/>
+                </a:ln>
+                <a:solidFill>
+                  <a:srgbClr val="000000"/>
+                </a:solidFill>
+                <a:uFillTx/>
+                <a:latin typeface="+mn-lt"/>
+                <a:ea typeface="+mn-ea"/>
+                <a:cs typeface="+mn-cs"/>
+                <a:sym typeface="Calibri"/>
+              </a:defRPr>
+            </a:lvl9pPr>
+          </a:lstStyle>
+          <a:p>
+            <a:pPr hangingPunct="1">
+              <a:defRPr sz="2800" b="1">
+                <a:solidFill>
+                  <a:srgbClr val="11A79D"/>
+                </a:solidFill>
+              </a:defRPr>
+            </a:pPr>
+            <a:r>
+              <a:rPr lang="pt-BR" sz="5400" b="1" dirty="0" smtClean="0">
+                <a:solidFill>
+                  <a:srgbClr val="11A79D"/>
+                </a:solidFill>
+              </a:rPr>
+              <a:t>Inje</a:t>
+            </a:r>
+            <a:r>
+              <a:rPr lang="pt-BR" sz="5400" b="1" dirty="0" smtClean="0">
+                <a:solidFill>
+                  <a:srgbClr val="11A79D"/>
+                </a:solidFill>
+              </a:rPr>
+              <a:t>ção de dependência</a:t>
+            </a:r>
+            <a:endParaRPr lang="pt-BR" sz="5400" b="1" dirty="0">
+              <a:solidFill>
+                <a:schemeClr val="tx2"/>
+              </a:solidFill>
+            </a:endParaRPr>
+          </a:p>
+        </p:txBody>
+      </p:sp>
+    </p:spTree>
+    <p:extLst>
+      <p:ext uri="{BB962C8B-B14F-4D97-AF65-F5344CB8AC3E}">
+        <p14:creationId xmlns:p14="http://schemas.microsoft.com/office/powerpoint/2010/main" val="440678834"/>
+      </p:ext>
+    </p:extLst>
+  </p:cSld>
+  <p:clrMapOvr>
+    <a:masterClrMapping/>
+  </p:clrMapOvr>
+  <mc:AlternateContent xmlns:mc="http://schemas.openxmlformats.org/markup-compatibility/2006" xmlns:p14="http://schemas.microsoft.com/office/powerpoint/2010/main">
+    <mc:Choice Requires="p14">
+      <p:transition spd="med" p14:dur="700">
+        <p:fade/>
+      </p:transition>
+    </mc:Choice>
+    <mc:Fallback xmlns="">
+      <p:transition spd="med">
+        <p:fade/>
+      </p:transition>
+    </mc:Fallback>
+  </mc:AlternateContent>
+  <p:timing>
+    <p:tnLst>
+      <p:par>
+        <p:cTn id="1" dur="indefinite" restart="never" nodeType="tmRoot"/>
+      </p:par>
+    </p:tnLst>
+  </p:timing>
+</p:sld>
+</file>
+
+<file path=ppt/slides/slide22.xml><?xml version="1.0" encoding="utf-8"?>
+<p:sld xmlns:a="http://schemas.openxmlformats.org/drawingml/2006/main" xmlns:r="http://schemas.openxmlformats.org/officeDocument/2006/relationships" xmlns:p="http://schemas.openxmlformats.org/presentationml/2006/main">
+  <p:cSld>
+    <p:spTree>
+      <p:nvGrpSpPr>
+        <p:cNvPr id="1" name=""/>
+        <p:cNvGrpSpPr/>
+        <p:nvPr/>
+      </p:nvGrpSpPr>
+      <p:grpSpPr>
+        <a:xfrm>
+          <a:off x="0" y="0"/>
+          <a:ext cx="0" cy="0"/>
+          <a:chOff x="0" y="0"/>
+          <a:chExt cx="0" cy="0"/>
+        </a:xfrm>
+      </p:grpSpPr>
+      <p:sp>
+        <p:nvSpPr>
+          <p:cNvPr id="2" name="CaixaDeTexto 1"/>
+          <p:cNvSpPr txBox="1"/>
+          <p:nvPr/>
+        </p:nvSpPr>
+        <p:spPr>
+          <a:xfrm>
+            <a:off x="1782866" y="2334029"/>
+            <a:ext cx="8495653" cy="2723821"/>
+          </a:xfrm>
+          <a:prstGeom prst="rect">
+            <a:avLst/>
+          </a:prstGeom>
+          <a:noFill/>
+          <a:ln w="12700" cap="flat">
+            <a:noFill/>
+            <a:miter lim="400000"/>
+          </a:ln>
+          <a:effectLst/>
+          <a:sp3d/>
+        </p:spPr>
+        <p:style>
+          <a:lnRef idx="0">
+            <a:scrgbClr r="0" g="0" b="0"/>
+          </a:lnRef>
+          <a:fillRef idx="0">
+            <a:scrgbClr r="0" g="0" b="0"/>
+          </a:fillRef>
+          <a:effectRef idx="0">
+            <a:scrgbClr r="0" g="0" b="0"/>
+          </a:effectRef>
+          <a:fontRef idx="none"/>
+        </p:style>
+        <p:txBody>
+          <a:bodyPr rot="0" spcFirstLastPara="1" vertOverflow="overflow" horzOverflow="overflow" vert="horz" wrap="square" lIns="45719" tIns="45719" rIns="45719" bIns="45719" numCol="1" spcCol="38100" rtlCol="0" anchor="t">
+            <a:spAutoFit/>
+          </a:bodyPr>
+          <a:lstStyle/>
+          <a:p>
+            <a:pPr marL="285750" lvl="8" indent="-285750" algn="just">
+              <a:lnSpc>
+                <a:spcPct val="150000"/>
+              </a:lnSpc>
+              <a:buFont typeface="Arial" pitchFamily="34" charset="0"/>
+              <a:buChar char="•"/>
+            </a:pPr>
+            <a:r>
+              <a:rPr lang="pt-BR" dirty="0" smtClean="0">
+                <a:solidFill>
+                  <a:srgbClr val="666666"/>
+                </a:solidFill>
+              </a:rPr>
+              <a:t>Oferece a possibilidade de reusar componentes</a:t>
+            </a:r>
+            <a:r>
+              <a:rPr lang="pt-BR" dirty="0">
+                <a:solidFill>
+                  <a:srgbClr val="666666"/>
+                </a:solidFill>
+              </a:rPr>
+              <a:t>, uma vez que criamos componentes interdependentes, eles podem ser facilmente implementados em sistemas </a:t>
+            </a:r>
+            <a:r>
+              <a:rPr lang="pt-BR" dirty="0" smtClean="0">
+                <a:solidFill>
+                  <a:srgbClr val="666666"/>
+                </a:solidFill>
+              </a:rPr>
+              <a:t>diversos;</a:t>
+            </a:r>
+            <a:endParaRPr lang="pt-BR" dirty="0">
+              <a:solidFill>
+                <a:srgbClr val="666666"/>
+              </a:solidFill>
+            </a:endParaRPr>
+          </a:p>
+          <a:p>
+            <a:pPr marL="285750" lvl="8" indent="-285750" algn="just">
+              <a:buFont typeface="Arial" pitchFamily="34" charset="0"/>
+              <a:buChar char="•"/>
+            </a:pPr>
+            <a:r>
+              <a:rPr lang="pt-BR" dirty="0">
+                <a:solidFill>
+                  <a:srgbClr val="666666"/>
+                </a:solidFill>
+              </a:rPr>
+              <a:t>Facilitar a manutenção de Sistemas, fazendo com que as manutenções em módulos não afetem o restante do </a:t>
+            </a:r>
+            <a:r>
+              <a:rPr lang="pt-BR" dirty="0" smtClean="0">
+                <a:solidFill>
+                  <a:srgbClr val="666666"/>
+                </a:solidFill>
+              </a:rPr>
+              <a:t>sistema;</a:t>
+            </a:r>
+            <a:endParaRPr lang="pt-BR" dirty="0">
+              <a:solidFill>
+                <a:srgbClr val="666666"/>
+              </a:solidFill>
+            </a:endParaRPr>
+          </a:p>
+          <a:p>
+            <a:pPr marL="285750" lvl="8" indent="-285750" algn="just">
+              <a:lnSpc>
+                <a:spcPct val="150000"/>
+              </a:lnSpc>
+              <a:buFont typeface="Arial" pitchFamily="34" charset="0"/>
+              <a:buChar char="•"/>
+            </a:pPr>
+            <a:r>
+              <a:rPr lang="pt-BR" dirty="0">
+                <a:solidFill>
+                  <a:srgbClr val="666666"/>
+                </a:solidFill>
+              </a:rPr>
+              <a:t>Criar códigos altamente “testáveis</a:t>
+            </a:r>
+            <a:r>
+              <a:rPr lang="pt-BR" dirty="0" smtClean="0">
+                <a:solidFill>
+                  <a:srgbClr val="666666"/>
+                </a:solidFill>
+              </a:rPr>
+              <a:t>”.;</a:t>
+            </a:r>
+          </a:p>
+          <a:p>
+            <a:pPr marL="285750" lvl="8" indent="-285750" algn="just">
+              <a:lnSpc>
+                <a:spcPct val="150000"/>
+              </a:lnSpc>
+              <a:buFont typeface="Arial" pitchFamily="34" charset="0"/>
+              <a:buChar char="•"/>
+            </a:pPr>
+            <a:r>
+              <a:rPr lang="pt-BR" dirty="0" smtClean="0">
+                <a:solidFill>
+                  <a:srgbClr val="666666"/>
+                </a:solidFill>
+              </a:rPr>
+              <a:t>Criar </a:t>
+            </a:r>
+            <a:r>
+              <a:rPr lang="pt-BR" dirty="0">
+                <a:solidFill>
+                  <a:srgbClr val="666666"/>
+                </a:solidFill>
+              </a:rPr>
+              <a:t>códigos mais legíveis, o que torna mais fácil a compreensão do sistema como um todo.</a:t>
+            </a:r>
+            <a:endParaRPr lang="pt-BR" dirty="0" smtClean="0">
+              <a:solidFill>
+                <a:srgbClr val="666666"/>
+              </a:solidFill>
+            </a:endParaRPr>
+          </a:p>
+        </p:txBody>
+      </p:sp>
+      <p:sp>
+        <p:nvSpPr>
+          <p:cNvPr id="6" name="Shape 120"/>
+          <p:cNvSpPr txBox="1">
+            <a:spLocks/>
+          </p:cNvSpPr>
+          <p:nvPr/>
+        </p:nvSpPr>
+        <p:spPr>
+          <a:xfrm>
+            <a:off x="1915893" y="755374"/>
+            <a:ext cx="8229600" cy="1143001"/>
+          </a:xfrm>
+          <a:prstGeom prst="rect">
+            <a:avLst/>
+          </a:prstGeom>
+          <a:ln w="12700">
+            <a:miter lim="400000"/>
+          </a:ln>
+          <a:extLst>
+            <a:ext uri="{C572A759-6A51-4108-AA02-DFA0A04FC94B}">
+              <ma14:wrappingTextBoxFlag xmlns:ma14="http://schemas.microsoft.com/office/mac/drawingml/2011/main" xmlns="" val="1"/>
+            </a:ext>
+          </a:extLst>
+        </p:spPr>
+        <p:txBody>
+          <a:bodyPr lIns="45719" rIns="45719" anchor="ctr">
+            <a:normAutofit/>
+          </a:bodyPr>
+          <a:lstStyle>
+            <a:lvl1pPr marL="0" marR="0" indent="0" algn="ctr" defTabSz="914400" rtl="0" latinLnBrk="0">
+              <a:lnSpc>
+                <a:spcPct val="100000"/>
+              </a:lnSpc>
+              <a:spcBef>
+                <a:spcPts val="0"/>
+              </a:spcBef>
+              <a:spcAft>
+                <a:spcPts val="0"/>
+              </a:spcAft>
+              <a:buClrTx/>
+              <a:buSzTx/>
+              <a:buFontTx/>
+              <a:buNone/>
+              <a:tabLst/>
+              <a:defRPr sz="4400" b="0" i="0" u="none" strike="noStrike" cap="none" spc="0" baseline="0">
+                <a:ln>
+                  <a:noFill/>
+                </a:ln>
+                <a:solidFill>
+                  <a:srgbClr val="000000"/>
+                </a:solidFill>
+                <a:uFillTx/>
+                <a:latin typeface="+mn-lt"/>
+                <a:ea typeface="+mn-ea"/>
+                <a:cs typeface="+mn-cs"/>
+                <a:sym typeface="Calibri"/>
+              </a:defRPr>
+            </a:lvl1pPr>
+            <a:lvl2pPr marL="0" marR="0" indent="0" algn="ctr" defTabSz="914400" rtl="0" latinLnBrk="0">
+              <a:lnSpc>
+                <a:spcPct val="100000"/>
+              </a:lnSpc>
+              <a:spcBef>
+                <a:spcPts val="0"/>
+              </a:spcBef>
+              <a:spcAft>
+                <a:spcPts val="0"/>
+              </a:spcAft>
+              <a:buClrTx/>
+              <a:buSzTx/>
+              <a:buFontTx/>
+              <a:buNone/>
+              <a:tabLst/>
+              <a:defRPr sz="4400" b="0" i="0" u="none" strike="noStrike" cap="none" spc="0" baseline="0">
+                <a:ln>
+                  <a:noFill/>
+                </a:ln>
+                <a:solidFill>
+                  <a:srgbClr val="000000"/>
+                </a:solidFill>
+                <a:uFillTx/>
+                <a:latin typeface="+mn-lt"/>
+                <a:ea typeface="+mn-ea"/>
+                <a:cs typeface="+mn-cs"/>
+                <a:sym typeface="Calibri"/>
+              </a:defRPr>
+            </a:lvl2pPr>
+            <a:lvl3pPr marL="0" marR="0" indent="0" algn="ctr" defTabSz="914400" rtl="0" latinLnBrk="0">
+              <a:lnSpc>
+                <a:spcPct val="100000"/>
+              </a:lnSpc>
+              <a:spcBef>
+                <a:spcPts val="0"/>
+              </a:spcBef>
+              <a:spcAft>
+                <a:spcPts val="0"/>
+              </a:spcAft>
+              <a:buClrTx/>
+              <a:buSzTx/>
+              <a:buFontTx/>
+              <a:buNone/>
+              <a:tabLst/>
+              <a:defRPr sz="4400" b="0" i="0" u="none" strike="noStrike" cap="none" spc="0" baseline="0">
+                <a:ln>
+                  <a:noFill/>
+                </a:ln>
+                <a:solidFill>
+                  <a:srgbClr val="000000"/>
+                </a:solidFill>
+                <a:uFillTx/>
+                <a:latin typeface="+mn-lt"/>
+                <a:ea typeface="+mn-ea"/>
+                <a:cs typeface="+mn-cs"/>
+                <a:sym typeface="Calibri"/>
+              </a:defRPr>
+            </a:lvl3pPr>
+            <a:lvl4pPr marL="0" marR="0" indent="0" algn="ctr" defTabSz="914400" rtl="0" latinLnBrk="0">
+              <a:lnSpc>
+                <a:spcPct val="100000"/>
+              </a:lnSpc>
+              <a:spcBef>
+                <a:spcPts val="0"/>
+              </a:spcBef>
+              <a:spcAft>
+                <a:spcPts val="0"/>
+              </a:spcAft>
+              <a:buClrTx/>
+              <a:buSzTx/>
+              <a:buFontTx/>
+              <a:buNone/>
+              <a:tabLst/>
+              <a:defRPr sz="4400" b="0" i="0" u="none" strike="noStrike" cap="none" spc="0" baseline="0">
+                <a:ln>
+                  <a:noFill/>
+                </a:ln>
+                <a:solidFill>
+                  <a:srgbClr val="000000"/>
+                </a:solidFill>
+                <a:uFillTx/>
+                <a:latin typeface="+mn-lt"/>
+                <a:ea typeface="+mn-ea"/>
+                <a:cs typeface="+mn-cs"/>
+                <a:sym typeface="Calibri"/>
+              </a:defRPr>
+            </a:lvl4pPr>
+            <a:lvl5pPr marL="0" marR="0" indent="0" algn="ctr" defTabSz="914400" rtl="0" latinLnBrk="0">
+              <a:lnSpc>
+                <a:spcPct val="100000"/>
+              </a:lnSpc>
+              <a:spcBef>
+                <a:spcPts val="0"/>
+              </a:spcBef>
+              <a:spcAft>
+                <a:spcPts val="0"/>
+              </a:spcAft>
+              <a:buClrTx/>
+              <a:buSzTx/>
+              <a:buFontTx/>
+              <a:buNone/>
+              <a:tabLst/>
+              <a:defRPr sz="4400" b="0" i="0" u="none" strike="noStrike" cap="none" spc="0" baseline="0">
+                <a:ln>
+                  <a:noFill/>
+                </a:ln>
+                <a:solidFill>
+                  <a:srgbClr val="000000"/>
+                </a:solidFill>
+                <a:uFillTx/>
+                <a:latin typeface="+mn-lt"/>
+                <a:ea typeface="+mn-ea"/>
+                <a:cs typeface="+mn-cs"/>
+                <a:sym typeface="Calibri"/>
+              </a:defRPr>
+            </a:lvl5pPr>
+            <a:lvl6pPr marL="0" marR="0" indent="0" algn="ctr" defTabSz="914400" rtl="0" latinLnBrk="0">
+              <a:lnSpc>
+                <a:spcPct val="100000"/>
+              </a:lnSpc>
+              <a:spcBef>
+                <a:spcPts val="0"/>
+              </a:spcBef>
+              <a:spcAft>
+                <a:spcPts val="0"/>
+              </a:spcAft>
+              <a:buClrTx/>
+              <a:buSzTx/>
+              <a:buFontTx/>
+              <a:buNone/>
+              <a:tabLst/>
+              <a:defRPr sz="4400" b="0" i="0" u="none" strike="noStrike" cap="none" spc="0" baseline="0">
+                <a:ln>
+                  <a:noFill/>
+                </a:ln>
+                <a:solidFill>
+                  <a:srgbClr val="000000"/>
+                </a:solidFill>
+                <a:uFillTx/>
+                <a:latin typeface="+mn-lt"/>
+                <a:ea typeface="+mn-ea"/>
+                <a:cs typeface="+mn-cs"/>
+                <a:sym typeface="Calibri"/>
+              </a:defRPr>
+            </a:lvl6pPr>
+            <a:lvl7pPr marL="0" marR="0" indent="0" algn="ctr" defTabSz="914400" rtl="0" latinLnBrk="0">
+              <a:lnSpc>
+                <a:spcPct val="100000"/>
+              </a:lnSpc>
+              <a:spcBef>
+                <a:spcPts val="0"/>
+              </a:spcBef>
+              <a:spcAft>
+                <a:spcPts val="0"/>
+              </a:spcAft>
+              <a:buClrTx/>
+              <a:buSzTx/>
+              <a:buFontTx/>
+              <a:buNone/>
+              <a:tabLst/>
+              <a:defRPr sz="4400" b="0" i="0" u="none" strike="noStrike" cap="none" spc="0" baseline="0">
+                <a:ln>
+                  <a:noFill/>
+                </a:ln>
+                <a:solidFill>
+                  <a:srgbClr val="000000"/>
+                </a:solidFill>
+                <a:uFillTx/>
+                <a:latin typeface="+mn-lt"/>
+                <a:ea typeface="+mn-ea"/>
+                <a:cs typeface="+mn-cs"/>
+                <a:sym typeface="Calibri"/>
+              </a:defRPr>
+            </a:lvl7pPr>
+            <a:lvl8pPr marL="0" marR="0" indent="0" algn="ctr" defTabSz="914400" rtl="0" latinLnBrk="0">
+              <a:lnSpc>
+                <a:spcPct val="100000"/>
+              </a:lnSpc>
+              <a:spcBef>
+                <a:spcPts val="0"/>
+              </a:spcBef>
+              <a:spcAft>
+                <a:spcPts val="0"/>
+              </a:spcAft>
+              <a:buClrTx/>
+              <a:buSzTx/>
+              <a:buFontTx/>
+              <a:buNone/>
+              <a:tabLst/>
+              <a:defRPr sz="4400" b="0" i="0" u="none" strike="noStrike" cap="none" spc="0" baseline="0">
+                <a:ln>
+                  <a:noFill/>
+                </a:ln>
+                <a:solidFill>
+                  <a:srgbClr val="000000"/>
+                </a:solidFill>
+                <a:uFillTx/>
+                <a:latin typeface="+mn-lt"/>
+                <a:ea typeface="+mn-ea"/>
+                <a:cs typeface="+mn-cs"/>
+                <a:sym typeface="Calibri"/>
+              </a:defRPr>
+            </a:lvl8pPr>
+            <a:lvl9pPr marL="0" marR="0" indent="0" algn="ctr" defTabSz="914400" rtl="0" latinLnBrk="0">
+              <a:lnSpc>
+                <a:spcPct val="100000"/>
+              </a:lnSpc>
+              <a:spcBef>
+                <a:spcPts val="0"/>
+              </a:spcBef>
+              <a:spcAft>
+                <a:spcPts val="0"/>
+              </a:spcAft>
+              <a:buClrTx/>
+              <a:buSzTx/>
+              <a:buFontTx/>
+              <a:buNone/>
+              <a:tabLst/>
+              <a:defRPr sz="4400" b="0" i="0" u="none" strike="noStrike" cap="none" spc="0" baseline="0">
+                <a:ln>
+                  <a:noFill/>
+                </a:ln>
+                <a:solidFill>
+                  <a:srgbClr val="000000"/>
+                </a:solidFill>
+                <a:uFillTx/>
+                <a:latin typeface="+mn-lt"/>
+                <a:ea typeface="+mn-ea"/>
+                <a:cs typeface="+mn-cs"/>
+                <a:sym typeface="Calibri"/>
+              </a:defRPr>
+            </a:lvl9pPr>
+          </a:lstStyle>
+          <a:p>
+            <a:pPr hangingPunct="1">
+              <a:defRPr sz="2800" b="1">
+                <a:solidFill>
+                  <a:srgbClr val="11A79D"/>
+                </a:solidFill>
+              </a:defRPr>
+            </a:pPr>
+            <a:r>
+              <a:rPr lang="pt-BR" sz="5400" b="1" dirty="0" smtClean="0">
+                <a:solidFill>
+                  <a:srgbClr val="11A79D"/>
+                </a:solidFill>
+              </a:rPr>
+              <a:t>Vantagens</a:t>
+            </a:r>
+            <a:endParaRPr lang="pt-BR" sz="5400" b="1" dirty="0">
+              <a:solidFill>
+                <a:schemeClr val="tx2"/>
+              </a:solidFill>
+            </a:endParaRPr>
+          </a:p>
+        </p:txBody>
+      </p:sp>
+    </p:spTree>
+    <p:extLst>
+      <p:ext uri="{BB962C8B-B14F-4D97-AF65-F5344CB8AC3E}">
+        <p14:creationId xmlns:p14="http://schemas.microsoft.com/office/powerpoint/2010/main" val="1234874507"/>
+      </p:ext>
+    </p:extLst>
+  </p:cSld>
+  <p:clrMapOvr>
+    <a:masterClrMapping/>
+  </p:clrMapOvr>
+  <mc:AlternateContent xmlns:mc="http://schemas.openxmlformats.org/markup-compatibility/2006" xmlns:p14="http://schemas.microsoft.com/office/powerpoint/2010/main">
+    <mc:Choice Requires="p14">
+      <p:transition spd="med" p14:dur="700">
+        <p:fade/>
+      </p:transition>
+    </mc:Choice>
+    <mc:Fallback xmlns="">
+      <p:transition spd="med">
+        <p:fade/>
+      </p:transition>
+    </mc:Fallback>
+  </mc:AlternateContent>
+  <p:timing>
+    <p:tnLst>
+      <p:par>
+        <p:cTn id="1" dur="indefinite" restart="never" nodeType="tmRoot"/>
+      </p:par>
+    </p:tnLst>
+  </p:timing>
+</p:sld>
+</file>
+
+<file path=ppt/slides/slide23.xml><?xml version="1.0" encoding="utf-8"?>
+<p:sld xmlns:a="http://schemas.openxmlformats.org/drawingml/2006/main" xmlns:r="http://schemas.openxmlformats.org/officeDocument/2006/relationships" xmlns:p="http://schemas.openxmlformats.org/presentationml/2006/main">
+  <p:cSld>
+    <p:spTree>
+      <p:nvGrpSpPr>
+        <p:cNvPr id="1" name=""/>
+        <p:cNvGrpSpPr/>
+        <p:nvPr/>
+      </p:nvGrpSpPr>
+      <p:grpSpPr>
+        <a:xfrm>
+          <a:off x="0" y="0"/>
+          <a:ext cx="0" cy="0"/>
+          <a:chOff x="0" y="0"/>
+          <a:chExt cx="0" cy="0"/>
+        </a:xfrm>
+      </p:grpSpPr>
+      <p:sp>
+        <p:nvSpPr>
+          <p:cNvPr id="6" name="Shape 120"/>
+          <p:cNvSpPr txBox="1">
+            <a:spLocks/>
+          </p:cNvSpPr>
+          <p:nvPr/>
+        </p:nvSpPr>
+        <p:spPr>
+          <a:xfrm>
+            <a:off x="1915893" y="755374"/>
+            <a:ext cx="8229600" cy="1143001"/>
+          </a:xfrm>
+          <a:prstGeom prst="rect">
+            <a:avLst/>
+          </a:prstGeom>
+          <a:ln w="12700">
+            <a:miter lim="400000"/>
+          </a:ln>
+          <a:extLst>
+            <a:ext uri="{C572A759-6A51-4108-AA02-DFA0A04FC94B}">
+              <ma14:wrappingTextBoxFlag xmlns:ma14="http://schemas.microsoft.com/office/mac/drawingml/2011/main" xmlns="" val="1"/>
+            </a:ext>
+          </a:extLst>
+        </p:spPr>
+        <p:txBody>
+          <a:bodyPr lIns="45719" rIns="45719" anchor="ctr">
+            <a:normAutofit/>
+          </a:bodyPr>
+          <a:lstStyle>
+            <a:lvl1pPr marL="0" marR="0" indent="0" algn="ctr" defTabSz="914400" rtl="0" latinLnBrk="0">
+              <a:lnSpc>
+                <a:spcPct val="100000"/>
+              </a:lnSpc>
+              <a:spcBef>
+                <a:spcPts val="0"/>
+              </a:spcBef>
+              <a:spcAft>
+                <a:spcPts val="0"/>
+              </a:spcAft>
+              <a:buClrTx/>
+              <a:buSzTx/>
+              <a:buFontTx/>
+              <a:buNone/>
+              <a:tabLst/>
+              <a:defRPr sz="4400" b="0" i="0" u="none" strike="noStrike" cap="none" spc="0" baseline="0">
+                <a:ln>
+                  <a:noFill/>
+                </a:ln>
+                <a:solidFill>
+                  <a:srgbClr val="000000"/>
+                </a:solidFill>
+                <a:uFillTx/>
+                <a:latin typeface="+mn-lt"/>
+                <a:ea typeface="+mn-ea"/>
+                <a:cs typeface="+mn-cs"/>
+                <a:sym typeface="Calibri"/>
+              </a:defRPr>
+            </a:lvl1pPr>
+            <a:lvl2pPr marL="0" marR="0" indent="0" algn="ctr" defTabSz="914400" rtl="0" latinLnBrk="0">
+              <a:lnSpc>
+                <a:spcPct val="100000"/>
+              </a:lnSpc>
+              <a:spcBef>
+                <a:spcPts val="0"/>
+              </a:spcBef>
+              <a:spcAft>
+                <a:spcPts val="0"/>
+              </a:spcAft>
+              <a:buClrTx/>
+              <a:buSzTx/>
+              <a:buFontTx/>
+              <a:buNone/>
+              <a:tabLst/>
+              <a:defRPr sz="4400" b="0" i="0" u="none" strike="noStrike" cap="none" spc="0" baseline="0">
+                <a:ln>
+                  <a:noFill/>
+                </a:ln>
+                <a:solidFill>
+                  <a:srgbClr val="000000"/>
+                </a:solidFill>
+                <a:uFillTx/>
+                <a:latin typeface="+mn-lt"/>
+                <a:ea typeface="+mn-ea"/>
+                <a:cs typeface="+mn-cs"/>
+                <a:sym typeface="Calibri"/>
+              </a:defRPr>
+            </a:lvl2pPr>
+            <a:lvl3pPr marL="0" marR="0" indent="0" algn="ctr" defTabSz="914400" rtl="0" latinLnBrk="0">
+              <a:lnSpc>
+                <a:spcPct val="100000"/>
+              </a:lnSpc>
+              <a:spcBef>
+                <a:spcPts val="0"/>
+              </a:spcBef>
+              <a:spcAft>
+                <a:spcPts val="0"/>
+              </a:spcAft>
+              <a:buClrTx/>
+              <a:buSzTx/>
+              <a:buFontTx/>
+              <a:buNone/>
+              <a:tabLst/>
+              <a:defRPr sz="4400" b="0" i="0" u="none" strike="noStrike" cap="none" spc="0" baseline="0">
+                <a:ln>
+                  <a:noFill/>
+                </a:ln>
+                <a:solidFill>
+                  <a:srgbClr val="000000"/>
+                </a:solidFill>
+                <a:uFillTx/>
+                <a:latin typeface="+mn-lt"/>
+                <a:ea typeface="+mn-ea"/>
+                <a:cs typeface="+mn-cs"/>
+                <a:sym typeface="Calibri"/>
+              </a:defRPr>
+            </a:lvl3pPr>
+            <a:lvl4pPr marL="0" marR="0" indent="0" algn="ctr" defTabSz="914400" rtl="0" latinLnBrk="0">
+              <a:lnSpc>
+                <a:spcPct val="100000"/>
+              </a:lnSpc>
+              <a:spcBef>
+                <a:spcPts val="0"/>
+              </a:spcBef>
+              <a:spcAft>
+                <a:spcPts val="0"/>
+              </a:spcAft>
+              <a:buClrTx/>
+              <a:buSzTx/>
+              <a:buFontTx/>
+              <a:buNone/>
+              <a:tabLst/>
+              <a:defRPr sz="4400" b="0" i="0" u="none" strike="noStrike" cap="none" spc="0" baseline="0">
+                <a:ln>
+                  <a:noFill/>
+                </a:ln>
+                <a:solidFill>
+                  <a:srgbClr val="000000"/>
+                </a:solidFill>
+                <a:uFillTx/>
+                <a:latin typeface="+mn-lt"/>
+                <a:ea typeface="+mn-ea"/>
+                <a:cs typeface="+mn-cs"/>
+                <a:sym typeface="Calibri"/>
+              </a:defRPr>
+            </a:lvl4pPr>
+            <a:lvl5pPr marL="0" marR="0" indent="0" algn="ctr" defTabSz="914400" rtl="0" latinLnBrk="0">
+              <a:lnSpc>
+                <a:spcPct val="100000"/>
+              </a:lnSpc>
+              <a:spcBef>
+                <a:spcPts val="0"/>
+              </a:spcBef>
+              <a:spcAft>
+                <a:spcPts val="0"/>
+              </a:spcAft>
+              <a:buClrTx/>
+              <a:buSzTx/>
+              <a:buFontTx/>
+              <a:buNone/>
+              <a:tabLst/>
+              <a:defRPr sz="4400" b="0" i="0" u="none" strike="noStrike" cap="none" spc="0" baseline="0">
+                <a:ln>
+                  <a:noFill/>
+                </a:ln>
+                <a:solidFill>
+                  <a:srgbClr val="000000"/>
+                </a:solidFill>
+                <a:uFillTx/>
+                <a:latin typeface="+mn-lt"/>
+                <a:ea typeface="+mn-ea"/>
+                <a:cs typeface="+mn-cs"/>
+                <a:sym typeface="Calibri"/>
+              </a:defRPr>
+            </a:lvl5pPr>
+            <a:lvl6pPr marL="0" marR="0" indent="0" algn="ctr" defTabSz="914400" rtl="0" latinLnBrk="0">
+              <a:lnSpc>
+                <a:spcPct val="100000"/>
+              </a:lnSpc>
+              <a:spcBef>
+                <a:spcPts val="0"/>
+              </a:spcBef>
+              <a:spcAft>
+                <a:spcPts val="0"/>
+              </a:spcAft>
+              <a:buClrTx/>
+              <a:buSzTx/>
+              <a:buFontTx/>
+              <a:buNone/>
+              <a:tabLst/>
+              <a:defRPr sz="4400" b="0" i="0" u="none" strike="noStrike" cap="none" spc="0" baseline="0">
+                <a:ln>
+                  <a:noFill/>
+                </a:ln>
+                <a:solidFill>
+                  <a:srgbClr val="000000"/>
+                </a:solidFill>
+                <a:uFillTx/>
+                <a:latin typeface="+mn-lt"/>
+                <a:ea typeface="+mn-ea"/>
+                <a:cs typeface="+mn-cs"/>
+                <a:sym typeface="Calibri"/>
+              </a:defRPr>
+            </a:lvl6pPr>
+            <a:lvl7pPr marL="0" marR="0" indent="0" algn="ctr" defTabSz="914400" rtl="0" latinLnBrk="0">
+              <a:lnSpc>
+                <a:spcPct val="100000"/>
+              </a:lnSpc>
+              <a:spcBef>
+                <a:spcPts val="0"/>
+              </a:spcBef>
+              <a:spcAft>
+                <a:spcPts val="0"/>
+              </a:spcAft>
+              <a:buClrTx/>
+              <a:buSzTx/>
+              <a:buFontTx/>
+              <a:buNone/>
+              <a:tabLst/>
+              <a:defRPr sz="4400" b="0" i="0" u="none" strike="noStrike" cap="none" spc="0" baseline="0">
+                <a:ln>
+                  <a:noFill/>
+                </a:ln>
+                <a:solidFill>
+                  <a:srgbClr val="000000"/>
+                </a:solidFill>
+                <a:uFillTx/>
+                <a:latin typeface="+mn-lt"/>
+                <a:ea typeface="+mn-ea"/>
+                <a:cs typeface="+mn-cs"/>
+                <a:sym typeface="Calibri"/>
+              </a:defRPr>
+            </a:lvl7pPr>
+            <a:lvl8pPr marL="0" marR="0" indent="0" algn="ctr" defTabSz="914400" rtl="0" latinLnBrk="0">
+              <a:lnSpc>
+                <a:spcPct val="100000"/>
+              </a:lnSpc>
+              <a:spcBef>
+                <a:spcPts val="0"/>
+              </a:spcBef>
+              <a:spcAft>
+                <a:spcPts val="0"/>
+              </a:spcAft>
+              <a:buClrTx/>
+              <a:buSzTx/>
+              <a:buFontTx/>
+              <a:buNone/>
+              <a:tabLst/>
+              <a:defRPr sz="4400" b="0" i="0" u="none" strike="noStrike" cap="none" spc="0" baseline="0">
+                <a:ln>
+                  <a:noFill/>
+                </a:ln>
+                <a:solidFill>
+                  <a:srgbClr val="000000"/>
+                </a:solidFill>
+                <a:uFillTx/>
+                <a:latin typeface="+mn-lt"/>
+                <a:ea typeface="+mn-ea"/>
+                <a:cs typeface="+mn-cs"/>
+                <a:sym typeface="Calibri"/>
+              </a:defRPr>
+            </a:lvl8pPr>
+            <a:lvl9pPr marL="0" marR="0" indent="0" algn="ctr" defTabSz="914400" rtl="0" latinLnBrk="0">
+              <a:lnSpc>
+                <a:spcPct val="100000"/>
+              </a:lnSpc>
+              <a:spcBef>
+                <a:spcPts val="0"/>
+              </a:spcBef>
+              <a:spcAft>
+                <a:spcPts val="0"/>
+              </a:spcAft>
+              <a:buClrTx/>
+              <a:buSzTx/>
+              <a:buFontTx/>
+              <a:buNone/>
+              <a:tabLst/>
+              <a:defRPr sz="4400" b="0" i="0" u="none" strike="noStrike" cap="none" spc="0" baseline="0">
+                <a:ln>
+                  <a:noFill/>
+                </a:ln>
+                <a:solidFill>
+                  <a:srgbClr val="000000"/>
+                </a:solidFill>
+                <a:uFillTx/>
+                <a:latin typeface="+mn-lt"/>
+                <a:ea typeface="+mn-ea"/>
+                <a:cs typeface="+mn-cs"/>
+                <a:sym typeface="Calibri"/>
+              </a:defRPr>
+            </a:lvl9pPr>
+          </a:lstStyle>
+          <a:p>
+            <a:pPr hangingPunct="1">
+              <a:defRPr sz="2800" b="1">
+                <a:solidFill>
+                  <a:srgbClr val="11A79D"/>
+                </a:solidFill>
+              </a:defRPr>
+            </a:pPr>
+            <a:r>
+              <a:rPr lang="pt-BR" sz="5400" b="1" dirty="0" smtClean="0">
+                <a:solidFill>
+                  <a:srgbClr val="11A79D"/>
+                </a:solidFill>
+              </a:rPr>
+              <a:t>Implementação</a:t>
+            </a:r>
+            <a:endParaRPr lang="pt-BR" sz="5400" b="1" dirty="0">
+              <a:solidFill>
+                <a:schemeClr val="tx2"/>
+              </a:solidFill>
+            </a:endParaRPr>
+          </a:p>
+        </p:txBody>
+      </p:sp>
+      <p:sp>
+        <p:nvSpPr>
+          <p:cNvPr id="5" name="CaixaDeTexto 4"/>
+          <p:cNvSpPr txBox="1"/>
+          <p:nvPr/>
+        </p:nvSpPr>
+        <p:spPr>
+          <a:xfrm>
+            <a:off x="1496663" y="2212488"/>
+            <a:ext cx="9068059" cy="3416318"/>
+          </a:xfrm>
+          <a:prstGeom prst="rect">
+            <a:avLst/>
+          </a:prstGeom>
+          <a:noFill/>
+          <a:ln w="12700" cap="flat">
+            <a:noFill/>
+            <a:miter lim="400000"/>
+          </a:ln>
+          <a:effectLst/>
+          <a:sp3d/>
+        </p:spPr>
+        <p:style>
+          <a:lnRef idx="0">
+            <a:scrgbClr r="0" g="0" b="0"/>
+          </a:lnRef>
+          <a:fillRef idx="0">
+            <a:scrgbClr r="0" g="0" b="0"/>
+          </a:fillRef>
+          <a:effectRef idx="0">
+            <a:scrgbClr r="0" g="0" b="0"/>
+          </a:effectRef>
+          <a:fontRef idx="none"/>
+        </p:style>
+        <p:txBody>
+          <a:bodyPr rot="0" spcFirstLastPara="1" vertOverflow="overflow" horzOverflow="overflow" vert="horz" wrap="square" lIns="45719" tIns="45719" rIns="45719" bIns="45719" numCol="1" spcCol="38100" rtlCol="0" anchor="t">
+            <a:spAutoFit/>
+          </a:bodyPr>
+          <a:lstStyle/>
+          <a:p>
+            <a:pPr marL="285750" lvl="8" indent="-285750" algn="just">
+              <a:lnSpc>
+                <a:spcPct val="150000"/>
+              </a:lnSpc>
+              <a:buFont typeface="Arial" pitchFamily="34" charset="0"/>
+              <a:buChar char="•"/>
+            </a:pPr>
+            <a:r>
+              <a:rPr lang="pt-BR" b="1" dirty="0" smtClean="0">
+                <a:solidFill>
+                  <a:srgbClr val="666666"/>
+                </a:solidFill>
+              </a:rPr>
+              <a:t>Construtor</a:t>
+            </a:r>
+            <a:r>
+              <a:rPr lang="pt-BR" dirty="0" smtClean="0">
+                <a:solidFill>
+                  <a:srgbClr val="666666"/>
+                </a:solidFill>
+              </a:rPr>
+              <a:t>: Modo </a:t>
+            </a:r>
+            <a:r>
+              <a:rPr lang="pt-BR" dirty="0">
+                <a:solidFill>
+                  <a:srgbClr val="666666"/>
+                </a:solidFill>
+              </a:rPr>
+              <a:t>em que implementamos a injeção de dependência na definição dos construtores das classes;</a:t>
+            </a:r>
+          </a:p>
+          <a:p>
+            <a:pPr marL="285750" lvl="8" indent="-285750" algn="just">
+              <a:lnSpc>
+                <a:spcPct val="150000"/>
+              </a:lnSpc>
+              <a:buFont typeface="Arial" pitchFamily="34" charset="0"/>
+              <a:buChar char="•"/>
+            </a:pPr>
+            <a:r>
+              <a:rPr lang="pt-BR" b="1" dirty="0" err="1">
+                <a:solidFill>
+                  <a:srgbClr val="666666"/>
+                </a:solidFill>
+              </a:rPr>
+              <a:t>Getter</a:t>
+            </a:r>
+            <a:r>
+              <a:rPr lang="pt-BR" b="1" dirty="0">
+                <a:solidFill>
+                  <a:srgbClr val="666666"/>
+                </a:solidFill>
+              </a:rPr>
+              <a:t> </a:t>
+            </a:r>
+            <a:r>
+              <a:rPr lang="pt-BR" b="1" dirty="0" err="1">
+                <a:solidFill>
+                  <a:srgbClr val="666666"/>
+                </a:solidFill>
+              </a:rPr>
+              <a:t>and</a:t>
+            </a:r>
+            <a:r>
+              <a:rPr lang="pt-BR" b="1" dirty="0">
+                <a:solidFill>
+                  <a:srgbClr val="666666"/>
+                </a:solidFill>
+              </a:rPr>
+              <a:t> </a:t>
+            </a:r>
+            <a:r>
+              <a:rPr lang="pt-BR" b="1" dirty="0" err="1" smtClean="0">
+                <a:solidFill>
+                  <a:srgbClr val="666666"/>
+                </a:solidFill>
+              </a:rPr>
+              <a:t>Setter</a:t>
+            </a:r>
+            <a:r>
+              <a:rPr lang="pt-BR" dirty="0" smtClean="0">
+                <a:solidFill>
+                  <a:srgbClr val="666666"/>
+                </a:solidFill>
+              </a:rPr>
+              <a:t>:  </a:t>
+            </a:r>
+            <a:r>
+              <a:rPr lang="pt-BR" dirty="0">
+                <a:solidFill>
+                  <a:srgbClr val="666666"/>
+                </a:solidFill>
+              </a:rPr>
+              <a:t>Modo em que implementamos a injeção de dependência na definição dos </a:t>
+            </a:r>
+            <a:r>
+              <a:rPr lang="pt-BR" dirty="0" err="1">
+                <a:solidFill>
+                  <a:srgbClr val="666666"/>
+                </a:solidFill>
+              </a:rPr>
+              <a:t>Gets</a:t>
+            </a:r>
+            <a:r>
+              <a:rPr lang="pt-BR" dirty="0">
+                <a:solidFill>
+                  <a:srgbClr val="666666"/>
+                </a:solidFill>
+              </a:rPr>
+              <a:t> e Sets das classes;</a:t>
+            </a:r>
+          </a:p>
+          <a:p>
+            <a:pPr marL="285750" lvl="8" indent="-285750" algn="just">
+              <a:lnSpc>
+                <a:spcPct val="150000"/>
+              </a:lnSpc>
+              <a:buFont typeface="Arial" pitchFamily="34" charset="0"/>
+              <a:buChar char="•"/>
+            </a:pPr>
+            <a:r>
+              <a:rPr lang="pt-BR" b="1" dirty="0">
+                <a:solidFill>
+                  <a:srgbClr val="666666"/>
+                </a:solidFill>
+              </a:rPr>
+              <a:t>Interface </a:t>
+            </a:r>
+            <a:r>
+              <a:rPr lang="pt-BR" b="1" dirty="0" err="1" smtClean="0">
+                <a:solidFill>
+                  <a:srgbClr val="666666"/>
+                </a:solidFill>
+              </a:rPr>
+              <a:t>Implementation</a:t>
+            </a:r>
+            <a:r>
+              <a:rPr lang="pt-BR" dirty="0" smtClean="0">
+                <a:solidFill>
+                  <a:srgbClr val="666666"/>
+                </a:solidFill>
+              </a:rPr>
+              <a:t>: Modo </a:t>
+            </a:r>
+            <a:r>
+              <a:rPr lang="pt-BR" dirty="0">
+                <a:solidFill>
+                  <a:srgbClr val="666666"/>
+                </a:solidFill>
+              </a:rPr>
+              <a:t>em que se usa a definição de Interfaces para realizar a injeção de dependência;</a:t>
+            </a:r>
+          </a:p>
+          <a:p>
+            <a:pPr marL="285750" lvl="8" indent="-285750" algn="just">
+              <a:lnSpc>
+                <a:spcPct val="150000"/>
+              </a:lnSpc>
+              <a:buFont typeface="Arial" pitchFamily="34" charset="0"/>
+              <a:buChar char="•"/>
+            </a:pPr>
+            <a:r>
+              <a:rPr lang="pt-BR" b="1" dirty="0">
+                <a:solidFill>
+                  <a:srgbClr val="666666"/>
+                </a:solidFill>
+              </a:rPr>
+              <a:t>Service </a:t>
+            </a:r>
+            <a:r>
+              <a:rPr lang="pt-BR" b="1" dirty="0" err="1" smtClean="0">
+                <a:solidFill>
+                  <a:srgbClr val="666666"/>
+                </a:solidFill>
+              </a:rPr>
+              <a:t>Locator</a:t>
+            </a:r>
+            <a:r>
+              <a:rPr lang="pt-BR" b="1" dirty="0" smtClean="0">
+                <a:solidFill>
+                  <a:srgbClr val="666666"/>
+                </a:solidFill>
+              </a:rPr>
+              <a:t>: </a:t>
+            </a:r>
+            <a:r>
+              <a:rPr lang="pt-BR" dirty="0" smtClean="0">
+                <a:solidFill>
+                  <a:srgbClr val="666666"/>
+                </a:solidFill>
+              </a:rPr>
+              <a:t>Modo </a:t>
+            </a:r>
+            <a:r>
+              <a:rPr lang="pt-BR" dirty="0">
+                <a:solidFill>
+                  <a:srgbClr val="666666"/>
+                </a:solidFill>
+              </a:rPr>
+              <a:t>em que construímos classes que servem como “localizadoras” de objetos que iremos instanciar em nossas outras classes.</a:t>
+            </a:r>
+            <a:endParaRPr lang="pt-BR" dirty="0" smtClean="0">
+              <a:solidFill>
+                <a:srgbClr val="666666"/>
+              </a:solidFill>
+            </a:endParaRPr>
+          </a:p>
+        </p:txBody>
+      </p:sp>
+    </p:spTree>
+    <p:extLst>
+      <p:ext uri="{BB962C8B-B14F-4D97-AF65-F5344CB8AC3E}">
+        <p14:creationId xmlns:p14="http://schemas.microsoft.com/office/powerpoint/2010/main" val="503822248"/>
+      </p:ext>
+    </p:extLst>
+  </p:cSld>
+  <p:clrMapOvr>
+    <a:masterClrMapping/>
+  </p:clrMapOvr>
+  <mc:AlternateContent xmlns:mc="http://schemas.openxmlformats.org/markup-compatibility/2006" xmlns:p14="http://schemas.microsoft.com/office/powerpoint/2010/main">
+    <mc:Choice Requires="p14">
+      <p:transition spd="med" p14:dur="700">
+        <p:fade/>
+      </p:transition>
+    </mc:Choice>
+    <mc:Fallback xmlns="">
+      <p:transition spd="med">
+        <p:fade/>
+      </p:transition>
+    </mc:Fallback>
+  </mc:AlternateContent>
+  <p:timing>
+    <p:tnLst>
+      <p:par>
+        <p:cTn id="1" dur="indefinite" restart="never" nodeType="tmRoot"/>
+      </p:par>
+    </p:tnLst>
+  </p:timing>
+</p:sld>
+</file>
+
+<file path=ppt/slides/slide24.xml><?xml version="1.0" encoding="utf-8"?>
+<p:sld xmlns:a="http://schemas.openxmlformats.org/drawingml/2006/main" xmlns:r="http://schemas.openxmlformats.org/officeDocument/2006/relationships" xmlns:p="http://schemas.openxmlformats.org/presentationml/2006/main">
+  <p:cSld>
+    <p:spTree>
+      <p:nvGrpSpPr>
+        <p:cNvPr id="1" name=""/>
+        <p:cNvGrpSpPr/>
+        <p:nvPr/>
+      </p:nvGrpSpPr>
+      <p:grpSpPr>
+        <a:xfrm>
+          <a:off x="0" y="0"/>
+          <a:ext cx="0" cy="0"/>
+          <a:chOff x="0" y="0"/>
+          <a:chExt cx="0" cy="0"/>
+        </a:xfrm>
+      </p:grpSpPr>
+      <p:sp>
+        <p:nvSpPr>
+          <p:cNvPr id="6" name="Shape 120"/>
+          <p:cNvSpPr txBox="1">
+            <a:spLocks/>
+          </p:cNvSpPr>
+          <p:nvPr/>
+        </p:nvSpPr>
+        <p:spPr>
+          <a:xfrm>
+            <a:off x="1915893" y="755374"/>
+            <a:ext cx="8229600" cy="1143001"/>
+          </a:xfrm>
+          <a:prstGeom prst="rect">
+            <a:avLst/>
+          </a:prstGeom>
+          <a:ln w="12700">
+            <a:miter lim="400000"/>
+          </a:ln>
+          <a:extLst>
+            <a:ext uri="{C572A759-6A51-4108-AA02-DFA0A04FC94B}">
+              <ma14:wrappingTextBoxFlag xmlns:ma14="http://schemas.microsoft.com/office/mac/drawingml/2011/main" xmlns="" val="1"/>
+            </a:ext>
+          </a:extLst>
+        </p:spPr>
+        <p:txBody>
+          <a:bodyPr lIns="45719" rIns="45719" anchor="ctr">
+            <a:normAutofit/>
+          </a:bodyPr>
+          <a:lstStyle>
+            <a:lvl1pPr marL="0" marR="0" indent="0" algn="ctr" defTabSz="914400" rtl="0" latinLnBrk="0">
+              <a:lnSpc>
+                <a:spcPct val="100000"/>
+              </a:lnSpc>
+              <a:spcBef>
+                <a:spcPts val="0"/>
+              </a:spcBef>
+              <a:spcAft>
+                <a:spcPts val="0"/>
+              </a:spcAft>
+              <a:buClrTx/>
+              <a:buSzTx/>
+              <a:buFontTx/>
+              <a:buNone/>
+              <a:tabLst/>
+              <a:defRPr sz="4400" b="0" i="0" u="none" strike="noStrike" cap="none" spc="0" baseline="0">
+                <a:ln>
+                  <a:noFill/>
+                </a:ln>
+                <a:solidFill>
+                  <a:srgbClr val="000000"/>
+                </a:solidFill>
+                <a:uFillTx/>
+                <a:latin typeface="+mn-lt"/>
+                <a:ea typeface="+mn-ea"/>
+                <a:cs typeface="+mn-cs"/>
+                <a:sym typeface="Calibri"/>
+              </a:defRPr>
+            </a:lvl1pPr>
+            <a:lvl2pPr marL="0" marR="0" indent="0" algn="ctr" defTabSz="914400" rtl="0" latinLnBrk="0">
+              <a:lnSpc>
+                <a:spcPct val="100000"/>
+              </a:lnSpc>
+              <a:spcBef>
+                <a:spcPts val="0"/>
+              </a:spcBef>
+              <a:spcAft>
+                <a:spcPts val="0"/>
+              </a:spcAft>
+              <a:buClrTx/>
+              <a:buSzTx/>
+              <a:buFontTx/>
+              <a:buNone/>
+              <a:tabLst/>
+              <a:defRPr sz="4400" b="0" i="0" u="none" strike="noStrike" cap="none" spc="0" baseline="0">
+                <a:ln>
+                  <a:noFill/>
+                </a:ln>
+                <a:solidFill>
+                  <a:srgbClr val="000000"/>
+                </a:solidFill>
+                <a:uFillTx/>
+                <a:latin typeface="+mn-lt"/>
+                <a:ea typeface="+mn-ea"/>
+                <a:cs typeface="+mn-cs"/>
+                <a:sym typeface="Calibri"/>
+              </a:defRPr>
+            </a:lvl2pPr>
+            <a:lvl3pPr marL="0" marR="0" indent="0" algn="ctr" defTabSz="914400" rtl="0" latinLnBrk="0">
+              <a:lnSpc>
+                <a:spcPct val="100000"/>
+              </a:lnSpc>
+              <a:spcBef>
+                <a:spcPts val="0"/>
+              </a:spcBef>
+              <a:spcAft>
+                <a:spcPts val="0"/>
+              </a:spcAft>
+              <a:buClrTx/>
+              <a:buSzTx/>
+              <a:buFontTx/>
+              <a:buNone/>
+              <a:tabLst/>
+              <a:defRPr sz="4400" b="0" i="0" u="none" strike="noStrike" cap="none" spc="0" baseline="0">
+                <a:ln>
+                  <a:noFill/>
+                </a:ln>
+                <a:solidFill>
+                  <a:srgbClr val="000000"/>
+                </a:solidFill>
+                <a:uFillTx/>
+                <a:latin typeface="+mn-lt"/>
+                <a:ea typeface="+mn-ea"/>
+                <a:cs typeface="+mn-cs"/>
+                <a:sym typeface="Calibri"/>
+              </a:defRPr>
+            </a:lvl3pPr>
+            <a:lvl4pPr marL="0" marR="0" indent="0" algn="ctr" defTabSz="914400" rtl="0" latinLnBrk="0">
+              <a:lnSpc>
+                <a:spcPct val="100000"/>
+              </a:lnSpc>
+              <a:spcBef>
+                <a:spcPts val="0"/>
+              </a:spcBef>
+              <a:spcAft>
+                <a:spcPts val="0"/>
+              </a:spcAft>
+              <a:buClrTx/>
+              <a:buSzTx/>
+              <a:buFontTx/>
+              <a:buNone/>
+              <a:tabLst/>
+              <a:defRPr sz="4400" b="0" i="0" u="none" strike="noStrike" cap="none" spc="0" baseline="0">
+                <a:ln>
+                  <a:noFill/>
+                </a:ln>
+                <a:solidFill>
+                  <a:srgbClr val="000000"/>
+                </a:solidFill>
+                <a:uFillTx/>
+                <a:latin typeface="+mn-lt"/>
+                <a:ea typeface="+mn-ea"/>
+                <a:cs typeface="+mn-cs"/>
+                <a:sym typeface="Calibri"/>
+              </a:defRPr>
+            </a:lvl4pPr>
+            <a:lvl5pPr marL="0" marR="0" indent="0" algn="ctr" defTabSz="914400" rtl="0" latinLnBrk="0">
+              <a:lnSpc>
+                <a:spcPct val="100000"/>
+              </a:lnSpc>
+              <a:spcBef>
+                <a:spcPts val="0"/>
+              </a:spcBef>
+              <a:spcAft>
+                <a:spcPts val="0"/>
+              </a:spcAft>
+              <a:buClrTx/>
+              <a:buSzTx/>
+              <a:buFontTx/>
+              <a:buNone/>
+              <a:tabLst/>
+              <a:defRPr sz="4400" b="0" i="0" u="none" strike="noStrike" cap="none" spc="0" baseline="0">
+                <a:ln>
+                  <a:noFill/>
+                </a:ln>
+                <a:solidFill>
+                  <a:srgbClr val="000000"/>
+                </a:solidFill>
+                <a:uFillTx/>
+                <a:latin typeface="+mn-lt"/>
+                <a:ea typeface="+mn-ea"/>
+                <a:cs typeface="+mn-cs"/>
+                <a:sym typeface="Calibri"/>
+              </a:defRPr>
+            </a:lvl5pPr>
+            <a:lvl6pPr marL="0" marR="0" indent="0" algn="ctr" defTabSz="914400" rtl="0" latinLnBrk="0">
+              <a:lnSpc>
+                <a:spcPct val="100000"/>
+              </a:lnSpc>
+              <a:spcBef>
+                <a:spcPts val="0"/>
+              </a:spcBef>
+              <a:spcAft>
+                <a:spcPts val="0"/>
+              </a:spcAft>
+              <a:buClrTx/>
+              <a:buSzTx/>
+              <a:buFontTx/>
+              <a:buNone/>
+              <a:tabLst/>
+              <a:defRPr sz="4400" b="0" i="0" u="none" strike="noStrike" cap="none" spc="0" baseline="0">
+                <a:ln>
+                  <a:noFill/>
+                </a:ln>
+                <a:solidFill>
+                  <a:srgbClr val="000000"/>
+                </a:solidFill>
+                <a:uFillTx/>
+                <a:latin typeface="+mn-lt"/>
+                <a:ea typeface="+mn-ea"/>
+                <a:cs typeface="+mn-cs"/>
+                <a:sym typeface="Calibri"/>
+              </a:defRPr>
+            </a:lvl6pPr>
+            <a:lvl7pPr marL="0" marR="0" indent="0" algn="ctr" defTabSz="914400" rtl="0" latinLnBrk="0">
+              <a:lnSpc>
+                <a:spcPct val="100000"/>
+              </a:lnSpc>
+              <a:spcBef>
+                <a:spcPts val="0"/>
+              </a:spcBef>
+              <a:spcAft>
+                <a:spcPts val="0"/>
+              </a:spcAft>
+              <a:buClrTx/>
+              <a:buSzTx/>
+              <a:buFontTx/>
+              <a:buNone/>
+              <a:tabLst/>
+              <a:defRPr sz="4400" b="0" i="0" u="none" strike="noStrike" cap="none" spc="0" baseline="0">
+                <a:ln>
+                  <a:noFill/>
+                </a:ln>
+                <a:solidFill>
+                  <a:srgbClr val="000000"/>
+                </a:solidFill>
+                <a:uFillTx/>
+                <a:latin typeface="+mn-lt"/>
+                <a:ea typeface="+mn-ea"/>
+                <a:cs typeface="+mn-cs"/>
+                <a:sym typeface="Calibri"/>
+              </a:defRPr>
+            </a:lvl7pPr>
+            <a:lvl8pPr marL="0" marR="0" indent="0" algn="ctr" defTabSz="914400" rtl="0" latinLnBrk="0">
+              <a:lnSpc>
+                <a:spcPct val="100000"/>
+              </a:lnSpc>
+              <a:spcBef>
+                <a:spcPts val="0"/>
+              </a:spcBef>
+              <a:spcAft>
+                <a:spcPts val="0"/>
+              </a:spcAft>
+              <a:buClrTx/>
+              <a:buSzTx/>
+              <a:buFontTx/>
+              <a:buNone/>
+              <a:tabLst/>
+              <a:defRPr sz="4400" b="0" i="0" u="none" strike="noStrike" cap="none" spc="0" baseline="0">
+                <a:ln>
+                  <a:noFill/>
+                </a:ln>
+                <a:solidFill>
+                  <a:srgbClr val="000000"/>
+                </a:solidFill>
+                <a:uFillTx/>
+                <a:latin typeface="+mn-lt"/>
+                <a:ea typeface="+mn-ea"/>
+                <a:cs typeface="+mn-cs"/>
+                <a:sym typeface="Calibri"/>
+              </a:defRPr>
+            </a:lvl8pPr>
+            <a:lvl9pPr marL="0" marR="0" indent="0" algn="ctr" defTabSz="914400" rtl="0" latinLnBrk="0">
+              <a:lnSpc>
+                <a:spcPct val="100000"/>
+              </a:lnSpc>
+              <a:spcBef>
+                <a:spcPts val="0"/>
+              </a:spcBef>
+              <a:spcAft>
+                <a:spcPts val="0"/>
+              </a:spcAft>
+              <a:buClrTx/>
+              <a:buSzTx/>
+              <a:buFontTx/>
+              <a:buNone/>
+              <a:tabLst/>
+              <a:defRPr sz="4400" b="0" i="0" u="none" strike="noStrike" cap="none" spc="0" baseline="0">
+                <a:ln>
+                  <a:noFill/>
+                </a:ln>
+                <a:solidFill>
+                  <a:srgbClr val="000000"/>
+                </a:solidFill>
+                <a:uFillTx/>
+                <a:latin typeface="+mn-lt"/>
+                <a:ea typeface="+mn-ea"/>
+                <a:cs typeface="+mn-cs"/>
+                <a:sym typeface="Calibri"/>
+              </a:defRPr>
+            </a:lvl9pPr>
+          </a:lstStyle>
+          <a:p>
+            <a:pPr hangingPunct="1">
+              <a:defRPr sz="2800" b="1">
+                <a:solidFill>
+                  <a:srgbClr val="11A79D"/>
+                </a:solidFill>
+              </a:defRPr>
+            </a:pPr>
+            <a:r>
+              <a:rPr lang="pt-BR" sz="5400" b="1" dirty="0" smtClean="0">
+                <a:solidFill>
+                  <a:srgbClr val="11A79D"/>
+                </a:solidFill>
+              </a:rPr>
+              <a:t>Ciclos de vida</a:t>
+            </a:r>
+            <a:endParaRPr lang="pt-BR" sz="5400" b="1" dirty="0">
+              <a:solidFill>
+                <a:schemeClr val="tx2"/>
+              </a:solidFill>
+            </a:endParaRPr>
+          </a:p>
+        </p:txBody>
+      </p:sp>
+      <p:sp>
+        <p:nvSpPr>
+          <p:cNvPr id="5" name="CaixaDeTexto 4"/>
+          <p:cNvSpPr txBox="1"/>
+          <p:nvPr/>
+        </p:nvSpPr>
+        <p:spPr>
+          <a:xfrm>
+            <a:off x="1496663" y="2212488"/>
+            <a:ext cx="9068059" cy="3416318"/>
+          </a:xfrm>
+          <a:prstGeom prst="rect">
+            <a:avLst/>
+          </a:prstGeom>
+          <a:noFill/>
+          <a:ln w="12700" cap="flat">
+            <a:noFill/>
+            <a:miter lim="400000"/>
+          </a:ln>
+          <a:effectLst/>
+          <a:sp3d/>
+        </p:spPr>
+        <p:style>
+          <a:lnRef idx="0">
+            <a:scrgbClr r="0" g="0" b="0"/>
+          </a:lnRef>
+          <a:fillRef idx="0">
+            <a:scrgbClr r="0" g="0" b="0"/>
+          </a:fillRef>
+          <a:effectRef idx="0">
+            <a:scrgbClr r="0" g="0" b="0"/>
+          </a:effectRef>
+          <a:fontRef idx="none"/>
+        </p:style>
+        <p:txBody>
+          <a:bodyPr rot="0" spcFirstLastPara="1" vertOverflow="overflow" horzOverflow="overflow" vert="horz" wrap="square" lIns="45719" tIns="45719" rIns="45719" bIns="45719" numCol="1" spcCol="38100" rtlCol="0" anchor="t">
+            <a:spAutoFit/>
+          </a:bodyPr>
+          <a:lstStyle/>
+          <a:p>
+            <a:pPr marL="285750" lvl="8" indent="-285750" algn="just">
+              <a:lnSpc>
+                <a:spcPct val="150000"/>
+              </a:lnSpc>
+              <a:buFont typeface="Arial" pitchFamily="34" charset="0"/>
+              <a:buChar char="•"/>
+            </a:pPr>
+            <a:r>
+              <a:rPr lang="pt-BR" b="1" dirty="0" err="1">
+                <a:solidFill>
+                  <a:srgbClr val="666666"/>
+                </a:solidFill>
+              </a:rPr>
+              <a:t>Singleton</a:t>
+            </a:r>
+            <a:r>
+              <a:rPr lang="pt-BR" dirty="0">
+                <a:solidFill>
+                  <a:srgbClr val="666666"/>
+                </a:solidFill>
+              </a:rPr>
+              <a:t> (que me garante um única referencia dessa classe no ciclo de vida de uma aplicação</a:t>
+            </a:r>
+            <a:r>
+              <a:rPr lang="pt-BR" dirty="0" smtClean="0">
+                <a:solidFill>
+                  <a:srgbClr val="666666"/>
+                </a:solidFill>
+              </a:rPr>
+              <a:t>);</a:t>
+            </a:r>
+            <a:endParaRPr lang="pt-BR" dirty="0">
+              <a:solidFill>
+                <a:srgbClr val="666666"/>
+              </a:solidFill>
+            </a:endParaRPr>
+          </a:p>
+          <a:p>
+            <a:pPr marL="285750" lvl="8" indent="-285750" algn="just">
+              <a:lnSpc>
+                <a:spcPct val="150000"/>
+              </a:lnSpc>
+              <a:buFont typeface="Arial" pitchFamily="34" charset="0"/>
+              <a:buChar char="•"/>
+            </a:pPr>
+            <a:r>
+              <a:rPr lang="pt-BR" b="1" dirty="0" err="1">
+                <a:solidFill>
+                  <a:srgbClr val="666666"/>
+                </a:solidFill>
+              </a:rPr>
+              <a:t>Transient</a:t>
+            </a:r>
+            <a:r>
+              <a:rPr lang="pt-BR" dirty="0">
+                <a:solidFill>
+                  <a:srgbClr val="666666"/>
+                </a:solidFill>
+              </a:rPr>
+              <a:t> (sempre gerará uma nova instância para cada item encontrado que possua tal dependência, ou seja, se houver 5 dependências serão 5 instâncias diferentes</a:t>
+            </a:r>
+            <a:r>
+              <a:rPr lang="pt-BR" dirty="0" smtClean="0">
+                <a:solidFill>
+                  <a:srgbClr val="666666"/>
+                </a:solidFill>
+              </a:rPr>
+              <a:t>);</a:t>
+            </a:r>
+            <a:endParaRPr lang="pt-BR" dirty="0">
+              <a:solidFill>
+                <a:srgbClr val="666666"/>
+              </a:solidFill>
+            </a:endParaRPr>
+          </a:p>
+          <a:p>
+            <a:pPr marL="285750" lvl="8" indent="-285750" algn="just">
+              <a:lnSpc>
+                <a:spcPct val="150000"/>
+              </a:lnSpc>
+              <a:buFont typeface="Arial" pitchFamily="34" charset="0"/>
+              <a:buChar char="•"/>
+            </a:pPr>
+            <a:r>
+              <a:rPr lang="pt-BR" b="1" dirty="0" err="1" smtClean="0">
+                <a:solidFill>
+                  <a:srgbClr val="666666"/>
+                </a:solidFill>
+              </a:rPr>
+              <a:t>Scoped</a:t>
+            </a:r>
+            <a:r>
+              <a:rPr lang="pt-BR" dirty="0" smtClean="0">
+                <a:solidFill>
+                  <a:srgbClr val="666666"/>
+                </a:solidFill>
+              </a:rPr>
+              <a:t> (essa difere da </a:t>
+            </a:r>
+            <a:r>
+              <a:rPr lang="pt-BR" dirty="0" err="1">
+                <a:solidFill>
+                  <a:srgbClr val="666666"/>
+                </a:solidFill>
+              </a:rPr>
+              <a:t>Transient</a:t>
+            </a:r>
+            <a:r>
+              <a:rPr lang="pt-BR" dirty="0">
+                <a:solidFill>
+                  <a:srgbClr val="666666"/>
+                </a:solidFill>
+              </a:rPr>
+              <a:t> que garante que em uma requisição seja criada um instância de um classe onde se houver outras dependências, seja utilizada essa única instância pra todas, renovando somente nas requisições subsequentes, mas, mantendo essa obrigatoriedade).</a:t>
+            </a:r>
+            <a:endParaRPr lang="pt-BR" dirty="0" smtClean="0">
+              <a:solidFill>
+                <a:srgbClr val="666666"/>
+              </a:solidFill>
+            </a:endParaRPr>
+          </a:p>
+        </p:txBody>
+      </p:sp>
+    </p:spTree>
+    <p:extLst>
+      <p:ext uri="{BB962C8B-B14F-4D97-AF65-F5344CB8AC3E}">
+        <p14:creationId xmlns:p14="http://schemas.microsoft.com/office/powerpoint/2010/main" val="176189040"/>
+      </p:ext>
+    </p:extLst>
+  </p:cSld>
+  <p:clrMapOvr>
+    <a:masterClrMapping/>
+  </p:clrMapOvr>
+  <mc:AlternateContent xmlns:mc="http://schemas.openxmlformats.org/markup-compatibility/2006" xmlns:p14="http://schemas.microsoft.com/office/powerpoint/2010/main">
+    <mc:Choice Requires="p14">
+      <p:transition spd="med" p14:dur="700">
+        <p:fade/>
+      </p:transition>
+    </mc:Choice>
+    <mc:Fallback xmlns="">
+      <p:transition spd="med">
+        <p:fade/>
+      </p:transition>
+    </mc:Fallback>
+  </mc:AlternateContent>
+  <p:timing>
+    <p:tnLst>
+      <p:par>
+        <p:cTn id="1" dur="indefinite" restart="never" nodeType="tmRoot"/>
+      </p:par>
+    </p:tnLst>
+  </p:timing>
+</p:sld>
+</file>
+
+<file path=ppt/slides/slide25.xml><?xml version="1.0" encoding="utf-8"?>
+<p:sld xmlns:a="http://schemas.openxmlformats.org/drawingml/2006/main" xmlns:r="http://schemas.openxmlformats.org/officeDocument/2006/relationships" xmlns:p="http://schemas.openxmlformats.org/presentationml/2006/main">
+  <p:cSld>
+    <p:spTree>
+      <p:nvGrpSpPr>
+        <p:cNvPr id="1" name=""/>
+        <p:cNvGrpSpPr/>
+        <p:nvPr/>
+      </p:nvGrpSpPr>
+      <p:grpSpPr>
+        <a:xfrm>
+          <a:off x="0" y="0"/>
+          <a:ext cx="0" cy="0"/>
+          <a:chOff x="0" y="0"/>
+          <a:chExt cx="0" cy="0"/>
+        </a:xfrm>
+      </p:grpSpPr>
+      <p:sp>
+        <p:nvSpPr>
+          <p:cNvPr id="6" name="Shape 120"/>
+          <p:cNvSpPr txBox="1">
+            <a:spLocks/>
+          </p:cNvSpPr>
+          <p:nvPr/>
+        </p:nvSpPr>
+        <p:spPr>
+          <a:xfrm>
+            <a:off x="1915893" y="755374"/>
+            <a:ext cx="8229600" cy="1143001"/>
+          </a:xfrm>
+          <a:prstGeom prst="rect">
+            <a:avLst/>
+          </a:prstGeom>
+          <a:ln w="12700">
+            <a:miter lim="400000"/>
+          </a:ln>
+          <a:extLst>
+            <a:ext uri="{C572A759-6A51-4108-AA02-DFA0A04FC94B}">
+              <ma14:wrappingTextBoxFlag xmlns:ma14="http://schemas.microsoft.com/office/mac/drawingml/2011/main" xmlns="" val="1"/>
+            </a:ext>
+          </a:extLst>
+        </p:spPr>
+        <p:txBody>
+          <a:bodyPr lIns="45719" rIns="45719" anchor="ctr">
+            <a:normAutofit/>
+          </a:bodyPr>
+          <a:lstStyle>
+            <a:lvl1pPr marL="0" marR="0" indent="0" algn="ctr" defTabSz="914400" rtl="0" latinLnBrk="0">
+              <a:lnSpc>
+                <a:spcPct val="100000"/>
+              </a:lnSpc>
+              <a:spcBef>
+                <a:spcPts val="0"/>
+              </a:spcBef>
+              <a:spcAft>
+                <a:spcPts val="0"/>
+              </a:spcAft>
+              <a:buClrTx/>
+              <a:buSzTx/>
+              <a:buFontTx/>
+              <a:buNone/>
+              <a:tabLst/>
+              <a:defRPr sz="4400" b="0" i="0" u="none" strike="noStrike" cap="none" spc="0" baseline="0">
+                <a:ln>
+                  <a:noFill/>
+                </a:ln>
+                <a:solidFill>
+                  <a:srgbClr val="000000"/>
+                </a:solidFill>
+                <a:uFillTx/>
+                <a:latin typeface="+mn-lt"/>
+                <a:ea typeface="+mn-ea"/>
+                <a:cs typeface="+mn-cs"/>
+                <a:sym typeface="Calibri"/>
+              </a:defRPr>
+            </a:lvl1pPr>
+            <a:lvl2pPr marL="0" marR="0" indent="0" algn="ctr" defTabSz="914400" rtl="0" latinLnBrk="0">
+              <a:lnSpc>
+                <a:spcPct val="100000"/>
+              </a:lnSpc>
+              <a:spcBef>
+                <a:spcPts val="0"/>
+              </a:spcBef>
+              <a:spcAft>
+                <a:spcPts val="0"/>
+              </a:spcAft>
+              <a:buClrTx/>
+              <a:buSzTx/>
+              <a:buFontTx/>
+              <a:buNone/>
+              <a:tabLst/>
+              <a:defRPr sz="4400" b="0" i="0" u="none" strike="noStrike" cap="none" spc="0" baseline="0">
+                <a:ln>
+                  <a:noFill/>
+                </a:ln>
+                <a:solidFill>
+                  <a:srgbClr val="000000"/>
+                </a:solidFill>
+                <a:uFillTx/>
+                <a:latin typeface="+mn-lt"/>
+                <a:ea typeface="+mn-ea"/>
+                <a:cs typeface="+mn-cs"/>
+                <a:sym typeface="Calibri"/>
+              </a:defRPr>
+            </a:lvl2pPr>
+            <a:lvl3pPr marL="0" marR="0" indent="0" algn="ctr" defTabSz="914400" rtl="0" latinLnBrk="0">
+              <a:lnSpc>
+                <a:spcPct val="100000"/>
+              </a:lnSpc>
+              <a:spcBef>
+                <a:spcPts val="0"/>
+              </a:spcBef>
+              <a:spcAft>
+                <a:spcPts val="0"/>
+              </a:spcAft>
+              <a:buClrTx/>
+              <a:buSzTx/>
+              <a:buFontTx/>
+              <a:buNone/>
+              <a:tabLst/>
+              <a:defRPr sz="4400" b="0" i="0" u="none" strike="noStrike" cap="none" spc="0" baseline="0">
+                <a:ln>
+                  <a:noFill/>
+                </a:ln>
+                <a:solidFill>
+                  <a:srgbClr val="000000"/>
+                </a:solidFill>
+                <a:uFillTx/>
+                <a:latin typeface="+mn-lt"/>
+                <a:ea typeface="+mn-ea"/>
+                <a:cs typeface="+mn-cs"/>
+                <a:sym typeface="Calibri"/>
+              </a:defRPr>
+            </a:lvl3pPr>
+            <a:lvl4pPr marL="0" marR="0" indent="0" algn="ctr" defTabSz="914400" rtl="0" latinLnBrk="0">
+              <a:lnSpc>
+                <a:spcPct val="100000"/>
+              </a:lnSpc>
+              <a:spcBef>
+                <a:spcPts val="0"/>
+              </a:spcBef>
+              <a:spcAft>
+                <a:spcPts val="0"/>
+              </a:spcAft>
+              <a:buClrTx/>
+              <a:buSzTx/>
+              <a:buFontTx/>
+              <a:buNone/>
+              <a:tabLst/>
+              <a:defRPr sz="4400" b="0" i="0" u="none" strike="noStrike" cap="none" spc="0" baseline="0">
+                <a:ln>
+                  <a:noFill/>
+                </a:ln>
+                <a:solidFill>
+                  <a:srgbClr val="000000"/>
+                </a:solidFill>
+                <a:uFillTx/>
+                <a:latin typeface="+mn-lt"/>
+                <a:ea typeface="+mn-ea"/>
+                <a:cs typeface="+mn-cs"/>
+                <a:sym typeface="Calibri"/>
+              </a:defRPr>
+            </a:lvl4pPr>
+            <a:lvl5pPr marL="0" marR="0" indent="0" algn="ctr" defTabSz="914400" rtl="0" latinLnBrk="0">
+              <a:lnSpc>
+                <a:spcPct val="100000"/>
+              </a:lnSpc>
+              <a:spcBef>
+                <a:spcPts val="0"/>
+              </a:spcBef>
+              <a:spcAft>
+                <a:spcPts val="0"/>
+              </a:spcAft>
+              <a:buClrTx/>
+              <a:buSzTx/>
+              <a:buFontTx/>
+              <a:buNone/>
+              <a:tabLst/>
+              <a:defRPr sz="4400" b="0" i="0" u="none" strike="noStrike" cap="none" spc="0" baseline="0">
+                <a:ln>
+                  <a:noFill/>
+                </a:ln>
+                <a:solidFill>
+                  <a:srgbClr val="000000"/>
+                </a:solidFill>
+                <a:uFillTx/>
+                <a:latin typeface="+mn-lt"/>
+                <a:ea typeface="+mn-ea"/>
+                <a:cs typeface="+mn-cs"/>
+                <a:sym typeface="Calibri"/>
+              </a:defRPr>
+            </a:lvl5pPr>
+            <a:lvl6pPr marL="0" marR="0" indent="0" algn="ctr" defTabSz="914400" rtl="0" latinLnBrk="0">
+              <a:lnSpc>
+                <a:spcPct val="100000"/>
+              </a:lnSpc>
+              <a:spcBef>
+                <a:spcPts val="0"/>
+              </a:spcBef>
+              <a:spcAft>
+                <a:spcPts val="0"/>
+              </a:spcAft>
+              <a:buClrTx/>
+              <a:buSzTx/>
+              <a:buFontTx/>
+              <a:buNone/>
+              <a:tabLst/>
+              <a:defRPr sz="4400" b="0" i="0" u="none" strike="noStrike" cap="none" spc="0" baseline="0">
+                <a:ln>
+                  <a:noFill/>
+                </a:ln>
+                <a:solidFill>
+                  <a:srgbClr val="000000"/>
+                </a:solidFill>
+                <a:uFillTx/>
+                <a:latin typeface="+mn-lt"/>
+                <a:ea typeface="+mn-ea"/>
+                <a:cs typeface="+mn-cs"/>
+                <a:sym typeface="Calibri"/>
+              </a:defRPr>
+            </a:lvl6pPr>
+            <a:lvl7pPr marL="0" marR="0" indent="0" algn="ctr" defTabSz="914400" rtl="0" latinLnBrk="0">
+              <a:lnSpc>
+                <a:spcPct val="100000"/>
+              </a:lnSpc>
+              <a:spcBef>
+                <a:spcPts val="0"/>
+              </a:spcBef>
+              <a:spcAft>
+                <a:spcPts val="0"/>
+              </a:spcAft>
+              <a:buClrTx/>
+              <a:buSzTx/>
+              <a:buFontTx/>
+              <a:buNone/>
+              <a:tabLst/>
+              <a:defRPr sz="4400" b="0" i="0" u="none" strike="noStrike" cap="none" spc="0" baseline="0">
+                <a:ln>
+                  <a:noFill/>
+                </a:ln>
+                <a:solidFill>
+                  <a:srgbClr val="000000"/>
+                </a:solidFill>
+                <a:uFillTx/>
+                <a:latin typeface="+mn-lt"/>
+                <a:ea typeface="+mn-ea"/>
+                <a:cs typeface="+mn-cs"/>
+                <a:sym typeface="Calibri"/>
+              </a:defRPr>
+            </a:lvl7pPr>
+            <a:lvl8pPr marL="0" marR="0" indent="0" algn="ctr" defTabSz="914400" rtl="0" latinLnBrk="0">
+              <a:lnSpc>
+                <a:spcPct val="100000"/>
+              </a:lnSpc>
+              <a:spcBef>
+                <a:spcPts val="0"/>
+              </a:spcBef>
+              <a:spcAft>
+                <a:spcPts val="0"/>
+              </a:spcAft>
+              <a:buClrTx/>
+              <a:buSzTx/>
+              <a:buFontTx/>
+              <a:buNone/>
+              <a:tabLst/>
+              <a:defRPr sz="4400" b="0" i="0" u="none" strike="noStrike" cap="none" spc="0" baseline="0">
+                <a:ln>
+                  <a:noFill/>
+                </a:ln>
+                <a:solidFill>
+                  <a:srgbClr val="000000"/>
+                </a:solidFill>
+                <a:uFillTx/>
+                <a:latin typeface="+mn-lt"/>
+                <a:ea typeface="+mn-ea"/>
+                <a:cs typeface="+mn-cs"/>
+                <a:sym typeface="Calibri"/>
+              </a:defRPr>
+            </a:lvl8pPr>
+            <a:lvl9pPr marL="0" marR="0" indent="0" algn="ctr" defTabSz="914400" rtl="0" latinLnBrk="0">
+              <a:lnSpc>
+                <a:spcPct val="100000"/>
+              </a:lnSpc>
+              <a:spcBef>
+                <a:spcPts val="0"/>
+              </a:spcBef>
+              <a:spcAft>
+                <a:spcPts val="0"/>
+              </a:spcAft>
+              <a:buClrTx/>
+              <a:buSzTx/>
+              <a:buFontTx/>
+              <a:buNone/>
+              <a:tabLst/>
+              <a:defRPr sz="4400" b="0" i="0" u="none" strike="noStrike" cap="none" spc="0" baseline="0">
+                <a:ln>
+                  <a:noFill/>
+                </a:ln>
+                <a:solidFill>
+                  <a:srgbClr val="000000"/>
+                </a:solidFill>
+                <a:uFillTx/>
+                <a:latin typeface="+mn-lt"/>
+                <a:ea typeface="+mn-ea"/>
+                <a:cs typeface="+mn-cs"/>
+                <a:sym typeface="Calibri"/>
+              </a:defRPr>
+            </a:lvl9pPr>
+          </a:lstStyle>
+          <a:p>
+            <a:pPr hangingPunct="1">
+              <a:defRPr sz="2800" b="1">
+                <a:solidFill>
+                  <a:srgbClr val="11A79D"/>
+                </a:solidFill>
+              </a:defRPr>
+            </a:pPr>
+            <a:r>
+              <a:rPr lang="pt-BR" sz="5400" b="1" dirty="0" smtClean="0">
+                <a:solidFill>
+                  <a:srgbClr val="11A79D"/>
+                </a:solidFill>
+              </a:rPr>
+              <a:t>Ciclos de vida</a:t>
+            </a:r>
+            <a:endParaRPr lang="pt-BR" sz="5400" b="1" dirty="0">
+              <a:solidFill>
+                <a:schemeClr val="tx2"/>
+              </a:solidFill>
+            </a:endParaRPr>
+          </a:p>
+        </p:txBody>
+      </p:sp>
+      <p:sp>
+        <p:nvSpPr>
+          <p:cNvPr id="5" name="CaixaDeTexto 4"/>
+          <p:cNvSpPr txBox="1"/>
+          <p:nvPr/>
+        </p:nvSpPr>
+        <p:spPr>
+          <a:xfrm>
+            <a:off x="1496663" y="2212488"/>
+            <a:ext cx="9068059" cy="507829"/>
+          </a:xfrm>
+          <a:prstGeom prst="rect">
+            <a:avLst/>
+          </a:prstGeom>
+          <a:noFill/>
+          <a:ln w="12700" cap="flat">
+            <a:noFill/>
+            <a:miter lim="400000"/>
+          </a:ln>
+          <a:effectLst/>
+          <a:sp3d/>
+        </p:spPr>
+        <p:style>
+          <a:lnRef idx="0">
+            <a:scrgbClr r="0" g="0" b="0"/>
+          </a:lnRef>
+          <a:fillRef idx="0">
+            <a:scrgbClr r="0" g="0" b="0"/>
+          </a:fillRef>
+          <a:effectRef idx="0">
+            <a:scrgbClr r="0" g="0" b="0"/>
+          </a:effectRef>
+          <a:fontRef idx="none"/>
+        </p:style>
+        <p:txBody>
+          <a:bodyPr rot="0" spcFirstLastPara="1" vertOverflow="overflow" horzOverflow="overflow" vert="horz" wrap="square" lIns="45719" tIns="45719" rIns="45719" bIns="45719" numCol="1" spcCol="38100" rtlCol="0" anchor="t">
+            <a:spAutoFit/>
+          </a:bodyPr>
+          <a:lstStyle/>
+          <a:p>
+            <a:pPr marL="285750" lvl="8" indent="-285750" algn="just">
+              <a:lnSpc>
+                <a:spcPct val="150000"/>
+              </a:lnSpc>
+              <a:buFont typeface="Arial" pitchFamily="34" charset="0"/>
+              <a:buChar char="•"/>
+            </a:pPr>
+            <a:r>
+              <a:rPr lang="pt-BR" b="1" dirty="0" smtClean="0">
+                <a:solidFill>
+                  <a:srgbClr val="666666"/>
+                </a:solidFill>
+              </a:rPr>
+              <a:t>Dar exemplos e configurar</a:t>
+            </a:r>
+            <a:endParaRPr lang="pt-BR" dirty="0" smtClean="0">
+              <a:solidFill>
+                <a:srgbClr val="666666"/>
+              </a:solidFill>
+            </a:endParaRPr>
+          </a:p>
+        </p:txBody>
+      </p:sp>
+    </p:spTree>
+    <p:extLst>
+      <p:ext uri="{BB962C8B-B14F-4D97-AF65-F5344CB8AC3E}">
+        <p14:creationId xmlns:p14="http://schemas.microsoft.com/office/powerpoint/2010/main" val="1785331960"/>
       </p:ext>
     </p:extLst>
   </p:cSld>
@@ -10149,7 +14031,7 @@
           </a:ln>
           <a:extLst>
             <a:ext uri="{C572A759-6A51-4108-AA02-DFA0A04FC94B}">
-              <ma14:wrappingTextBoxFlag xmlns="" xmlns:ma14="http://schemas.microsoft.com/office/mac/drawingml/2011/main" val="1"/>
+              <ma14:wrappingTextBoxFlag xmlns:ma14="http://schemas.microsoft.com/office/mac/drawingml/2011/main" xmlns="" val="1"/>
             </a:ext>
           </a:extLst>
         </p:spPr>
@@ -10785,7 +14667,7 @@
           </a:ln>
           <a:extLst>
             <a:ext uri="{C572A759-6A51-4108-AA02-DFA0A04FC94B}">
-              <ma14:wrappingTextBoxFlag xmlns="" xmlns:ma14="http://schemas.microsoft.com/office/mac/drawingml/2011/main" val="1"/>
+              <ma14:wrappingTextBoxFlag xmlns:ma14="http://schemas.microsoft.com/office/mac/drawingml/2011/main" xmlns="" val="1"/>
             </a:ext>
           </a:extLst>
         </p:spPr>
@@ -11402,7 +15284,7 @@
           </a:ln>
           <a:extLst>
             <a:ext uri="{C572A759-6A51-4108-AA02-DFA0A04FC94B}">
-              <ma14:wrappingTextBoxFlag xmlns="" xmlns:ma14="http://schemas.microsoft.com/office/mac/drawingml/2011/main" val="1"/>
+              <ma14:wrappingTextBoxFlag xmlns:ma14="http://schemas.microsoft.com/office/mac/drawingml/2011/main" xmlns="" val="1"/>
             </a:ext>
           </a:extLst>
         </p:spPr>
@@ -12024,7 +15906,7 @@
           </a:ln>
           <a:extLst>
             <a:ext uri="{C572A759-6A51-4108-AA02-DFA0A04FC94B}">
-              <ma14:wrappingTextBoxFlag xmlns="" xmlns:ma14="http://schemas.microsoft.com/office/mac/drawingml/2011/main" val="1"/>
+              <ma14:wrappingTextBoxFlag xmlns:ma14="http://schemas.microsoft.com/office/mac/drawingml/2011/main" xmlns="" val="1"/>
             </a:ext>
           </a:extLst>
         </p:spPr>
@@ -12581,7 +16463,7 @@
           </a:ln>
           <a:extLst>
             <a:ext uri="{C572A759-6A51-4108-AA02-DFA0A04FC94B}">
-              <ma14:wrappingTextBoxFlag xmlns="" xmlns:ma14="http://schemas.microsoft.com/office/mac/drawingml/2011/main" val="1"/>
+              <ma14:wrappingTextBoxFlag xmlns:ma14="http://schemas.microsoft.com/office/mac/drawingml/2011/main" xmlns="" val="1"/>
             </a:ext>
           </a:extLst>
         </p:spPr>
@@ -12992,7 +16874,7 @@
           </a:ln>
           <a:extLst>
             <a:ext uri="{C572A759-6A51-4108-AA02-DFA0A04FC94B}">
-              <ma14:wrappingTextBoxFlag xmlns="" xmlns:ma14="http://schemas.microsoft.com/office/mac/drawingml/2011/main" val="1"/>
+              <ma14:wrappingTextBoxFlag xmlns:ma14="http://schemas.microsoft.com/office/mac/drawingml/2011/main" xmlns="" val="1"/>
             </a:ext>
           </a:extLst>
         </p:spPr>
@@ -13627,7 +17509,7 @@
           </a:ln>
           <a:extLst>
             <a:ext uri="{C572A759-6A51-4108-AA02-DFA0A04FC94B}">
-              <ma14:wrappingTextBoxFlag xmlns="" xmlns:ma14="http://schemas.microsoft.com/office/mac/drawingml/2011/main" val="1"/>
+              <ma14:wrappingTextBoxFlag xmlns:ma14="http://schemas.microsoft.com/office/mac/drawingml/2011/main" xmlns="" val="1"/>
             </a:ext>
           </a:extLst>
         </p:spPr>

</xml_diff>